<commit_message>
UserGuide and DevGuide documentation (#235)
* Remove .PNG pictures, add .png pictures

* Dev Guide: Update add command

* UserGuide: update "add new account" section

* UserGuide: add note on parsing of passwords.json file

* update add activity diagram with bigger words

* DevGuide: login/logout current implementation

* Update dev guide: design considerations

* Update PPP with PRs reviewed

* AboutUs.adoc: Fix spelling of my name

* DevGuide: Add instructions for manual testing

* Update PPP

* DevGuide: Add LogInCommand sequence diagram

* Remove johndoe's PPP

* Remove unnecessary pictures in UserGuide

* Update Storage Diagram

* Add XML diagrams, update PPP
</commit_message>
<xml_diff>
--- a/docs/diagrams/StorageComponentClassDiagram.pptx
+++ b/docs/diagrams/StorageComponentClassDiagram.pptx
@@ -107,6 +107,22 @@
       </a:defRPr>
     </a:lvl9pPr>
   </p:defaultTextStyle>
+  <p:extLst>
+    <p:ext uri="{EFAFB233-063F-42B5-8137-9DF3F51BA10A}">
+      <p15:sldGuideLst xmlns:p15="http://schemas.microsoft.com/office/powerpoint/2012/main">
+        <p15:guide id="1" orient="horz" pos="1488">
+          <p15:clr>
+            <a:srgbClr val="A4A3A4"/>
+          </p15:clr>
+        </p15:guide>
+        <p15:guide id="2" pos="2880">
+          <p15:clr>
+            <a:srgbClr val="A4A3A4"/>
+          </p15:clr>
+        </p15:guide>
+      </p15:sldGuideLst>
+    </p:ext>
+  </p:extLst>
 </p:presentation>
 </file>
 
@@ -192,7 +208,7 @@
           <a:p>
             <a:fld id="{F5CC4B3F-88C1-4FFA-B1B6-F41C21DC6924}" type="datetimeFigureOut">
               <a:rPr lang="en-US" smtClean="0"/>
-              <a:t>10/16/2016</a:t>
+              <a:t>11/11/2018</a:t>
             </a:fld>
             <a:endParaRPr lang="en-US"/>
           </a:p>
@@ -256,38 +272,37 @@
           <a:p>
             <a:pPr lvl="0"/>
             <a:r>
-              <a:rPr lang="en-US" smtClean="0"/>
+              <a:rPr lang="en-US"/>
               <a:t>Click to edit Master text styles</a:t>
             </a:r>
           </a:p>
           <a:p>
             <a:pPr lvl="1"/>
             <a:r>
-              <a:rPr lang="en-US" smtClean="0"/>
+              <a:rPr lang="en-US"/>
               <a:t>Second level</a:t>
             </a:r>
           </a:p>
           <a:p>
             <a:pPr lvl="2"/>
             <a:r>
-              <a:rPr lang="en-US" smtClean="0"/>
+              <a:rPr lang="en-US"/>
               <a:t>Third level</a:t>
             </a:r>
           </a:p>
           <a:p>
             <a:pPr lvl="3"/>
             <a:r>
-              <a:rPr lang="en-US" smtClean="0"/>
+              <a:rPr lang="en-US"/>
               <a:t>Fourth level</a:t>
             </a:r>
           </a:p>
           <a:p>
             <a:pPr lvl="4"/>
             <a:r>
-              <a:rPr lang="en-US" smtClean="0"/>
+              <a:rPr lang="en-US"/>
               <a:t>Fifth level</a:t>
             </a:r>
-            <a:endParaRPr lang="en-US"/>
           </a:p>
         </p:txBody>
       </p:sp>
@@ -498,10 +513,9 @@
           <a:lstStyle/>
           <a:p>
             <a:r>
-              <a:rPr lang="en-US" smtClean="0"/>
+              <a:rPr lang="en-US"/>
               <a:t>Click to edit Master title style</a:t>
             </a:r>
-            <a:endParaRPr lang="en-US"/>
           </a:p>
         </p:txBody>
       </p:sp>
@@ -617,10 +631,9 @@
           </a:lstStyle>
           <a:p>
             <a:r>
-              <a:rPr lang="en-US" smtClean="0"/>
+              <a:rPr lang="en-US"/>
               <a:t>Click to edit Master subtitle style</a:t>
             </a:r>
-            <a:endParaRPr lang="en-US"/>
           </a:p>
         </p:txBody>
       </p:sp>
@@ -641,7 +654,7 @@
           <a:p>
             <a:fld id="{78C97017-6FC3-485B-9764-EAC9E56C1D49}" type="datetimeFigureOut">
               <a:rPr lang="en-US" smtClean="0"/>
-              <a:t>10/16/2016</a:t>
+              <a:t>11/11/2018</a:t>
             </a:fld>
             <a:endParaRPr lang="en-US"/>
           </a:p>
@@ -735,10 +748,9 @@
           <a:lstStyle/>
           <a:p>
             <a:r>
-              <a:rPr lang="en-US" smtClean="0"/>
+              <a:rPr lang="en-US"/>
               <a:t>Click to edit Master title style</a:t>
             </a:r>
-            <a:endParaRPr lang="en-US"/>
           </a:p>
         </p:txBody>
       </p:sp>
@@ -759,38 +771,37 @@
           <a:p>
             <a:pPr lvl="0"/>
             <a:r>
-              <a:rPr lang="en-US" smtClean="0"/>
+              <a:rPr lang="en-US"/>
               <a:t>Click to edit Master text styles</a:t>
             </a:r>
           </a:p>
           <a:p>
             <a:pPr lvl="1"/>
             <a:r>
-              <a:rPr lang="en-US" smtClean="0"/>
+              <a:rPr lang="en-US"/>
               <a:t>Second level</a:t>
             </a:r>
           </a:p>
           <a:p>
             <a:pPr lvl="2"/>
             <a:r>
-              <a:rPr lang="en-US" smtClean="0"/>
+              <a:rPr lang="en-US"/>
               <a:t>Third level</a:t>
             </a:r>
           </a:p>
           <a:p>
             <a:pPr lvl="3"/>
             <a:r>
-              <a:rPr lang="en-US" smtClean="0"/>
+              <a:rPr lang="en-US"/>
               <a:t>Fourth level</a:t>
             </a:r>
           </a:p>
           <a:p>
             <a:pPr lvl="4"/>
             <a:r>
-              <a:rPr lang="en-US" smtClean="0"/>
+              <a:rPr lang="en-US"/>
               <a:t>Fifth level</a:t>
             </a:r>
-            <a:endParaRPr lang="en-US"/>
           </a:p>
         </p:txBody>
       </p:sp>
@@ -811,7 +822,7 @@
           <a:p>
             <a:fld id="{78C97017-6FC3-485B-9764-EAC9E56C1D49}" type="datetimeFigureOut">
               <a:rPr lang="en-US" smtClean="0"/>
-              <a:t>10/16/2016</a:t>
+              <a:t>11/11/2018</a:t>
             </a:fld>
             <a:endParaRPr lang="en-US"/>
           </a:p>
@@ -910,10 +921,9 @@
           <a:lstStyle/>
           <a:p>
             <a:r>
-              <a:rPr lang="en-US" smtClean="0"/>
+              <a:rPr lang="en-US"/>
               <a:t>Click to edit Master title style</a:t>
             </a:r>
-            <a:endParaRPr lang="en-US"/>
           </a:p>
         </p:txBody>
       </p:sp>
@@ -939,38 +949,37 @@
           <a:p>
             <a:pPr lvl="0"/>
             <a:r>
-              <a:rPr lang="en-US" smtClean="0"/>
+              <a:rPr lang="en-US"/>
               <a:t>Click to edit Master text styles</a:t>
             </a:r>
           </a:p>
           <a:p>
             <a:pPr lvl="1"/>
             <a:r>
-              <a:rPr lang="en-US" smtClean="0"/>
+              <a:rPr lang="en-US"/>
               <a:t>Second level</a:t>
             </a:r>
           </a:p>
           <a:p>
             <a:pPr lvl="2"/>
             <a:r>
-              <a:rPr lang="en-US" smtClean="0"/>
+              <a:rPr lang="en-US"/>
               <a:t>Third level</a:t>
             </a:r>
           </a:p>
           <a:p>
             <a:pPr lvl="3"/>
             <a:r>
-              <a:rPr lang="en-US" smtClean="0"/>
+              <a:rPr lang="en-US"/>
               <a:t>Fourth level</a:t>
             </a:r>
           </a:p>
           <a:p>
             <a:pPr lvl="4"/>
             <a:r>
-              <a:rPr lang="en-US" smtClean="0"/>
+              <a:rPr lang="en-US"/>
               <a:t>Fifth level</a:t>
             </a:r>
-            <a:endParaRPr lang="en-US"/>
           </a:p>
         </p:txBody>
       </p:sp>
@@ -991,7 +1000,7 @@
           <a:p>
             <a:fld id="{78C97017-6FC3-485B-9764-EAC9E56C1D49}" type="datetimeFigureOut">
               <a:rPr lang="en-US" smtClean="0"/>
-              <a:t>10/16/2016</a:t>
+              <a:t>11/11/2018</a:t>
             </a:fld>
             <a:endParaRPr lang="en-US"/>
           </a:p>
@@ -1085,10 +1094,9 @@
           <a:lstStyle/>
           <a:p>
             <a:r>
-              <a:rPr lang="en-US" smtClean="0"/>
+              <a:rPr lang="en-US"/>
               <a:t>Click to edit Master title style</a:t>
             </a:r>
-            <a:endParaRPr lang="en-US"/>
           </a:p>
         </p:txBody>
       </p:sp>
@@ -1109,38 +1117,37 @@
           <a:p>
             <a:pPr lvl="0"/>
             <a:r>
-              <a:rPr lang="en-US" smtClean="0"/>
+              <a:rPr lang="en-US"/>
               <a:t>Click to edit Master text styles</a:t>
             </a:r>
           </a:p>
           <a:p>
             <a:pPr lvl="1"/>
             <a:r>
-              <a:rPr lang="en-US" smtClean="0"/>
+              <a:rPr lang="en-US"/>
               <a:t>Second level</a:t>
             </a:r>
           </a:p>
           <a:p>
             <a:pPr lvl="2"/>
             <a:r>
-              <a:rPr lang="en-US" smtClean="0"/>
+              <a:rPr lang="en-US"/>
               <a:t>Third level</a:t>
             </a:r>
           </a:p>
           <a:p>
             <a:pPr lvl="3"/>
             <a:r>
-              <a:rPr lang="en-US" smtClean="0"/>
+              <a:rPr lang="en-US"/>
               <a:t>Fourth level</a:t>
             </a:r>
           </a:p>
           <a:p>
             <a:pPr lvl="4"/>
             <a:r>
-              <a:rPr lang="en-US" smtClean="0"/>
+              <a:rPr lang="en-US"/>
               <a:t>Fifth level</a:t>
             </a:r>
-            <a:endParaRPr lang="en-US"/>
           </a:p>
         </p:txBody>
       </p:sp>
@@ -1161,7 +1168,7 @@
           <a:p>
             <a:fld id="{78C97017-6FC3-485B-9764-EAC9E56C1D49}" type="datetimeFigureOut">
               <a:rPr lang="en-US" smtClean="0"/>
-              <a:t>10/16/2016</a:t>
+              <a:t>11/11/2018</a:t>
             </a:fld>
             <a:endParaRPr lang="en-US"/>
           </a:p>
@@ -1264,10 +1271,9 @@
           </a:lstStyle>
           <a:p>
             <a:r>
-              <a:rPr lang="en-US" smtClean="0"/>
+              <a:rPr lang="en-US"/>
               <a:t>Click to edit Master title style</a:t>
             </a:r>
-            <a:endParaRPr lang="en-US"/>
           </a:p>
         </p:txBody>
       </p:sp>
@@ -1384,7 +1390,7 @@
           <a:p>
             <a:pPr lvl="0"/>
             <a:r>
-              <a:rPr lang="en-US" smtClean="0"/>
+              <a:rPr lang="en-US"/>
               <a:t>Click to edit Master text styles</a:t>
             </a:r>
           </a:p>
@@ -1407,7 +1413,7 @@
           <a:p>
             <a:fld id="{78C97017-6FC3-485B-9764-EAC9E56C1D49}" type="datetimeFigureOut">
               <a:rPr lang="en-US" smtClean="0"/>
-              <a:t>10/16/2016</a:t>
+              <a:t>11/11/2018</a:t>
             </a:fld>
             <a:endParaRPr lang="en-US"/>
           </a:p>
@@ -1501,10 +1507,9 @@
           <a:lstStyle/>
           <a:p>
             <a:r>
-              <a:rPr lang="en-US" smtClean="0"/>
+              <a:rPr lang="en-US"/>
               <a:t>Click to edit Master title style</a:t>
             </a:r>
-            <a:endParaRPr lang="en-US"/>
           </a:p>
         </p:txBody>
       </p:sp>
@@ -1558,38 +1563,37 @@
           <a:p>
             <a:pPr lvl="0"/>
             <a:r>
-              <a:rPr lang="en-US" smtClean="0"/>
+              <a:rPr lang="en-US"/>
               <a:t>Click to edit Master text styles</a:t>
             </a:r>
           </a:p>
           <a:p>
             <a:pPr lvl="1"/>
             <a:r>
-              <a:rPr lang="en-US" smtClean="0"/>
+              <a:rPr lang="en-US"/>
               <a:t>Second level</a:t>
             </a:r>
           </a:p>
           <a:p>
             <a:pPr lvl="2"/>
             <a:r>
-              <a:rPr lang="en-US" smtClean="0"/>
+              <a:rPr lang="en-US"/>
               <a:t>Third level</a:t>
             </a:r>
           </a:p>
           <a:p>
             <a:pPr lvl="3"/>
             <a:r>
-              <a:rPr lang="en-US" smtClean="0"/>
+              <a:rPr lang="en-US"/>
               <a:t>Fourth level</a:t>
             </a:r>
           </a:p>
           <a:p>
             <a:pPr lvl="4"/>
             <a:r>
-              <a:rPr lang="en-US" smtClean="0"/>
+              <a:rPr lang="en-US"/>
               <a:t>Fifth level</a:t>
             </a:r>
-            <a:endParaRPr lang="en-US"/>
           </a:p>
         </p:txBody>
       </p:sp>
@@ -1643,38 +1647,37 @@
           <a:p>
             <a:pPr lvl="0"/>
             <a:r>
-              <a:rPr lang="en-US" smtClean="0"/>
+              <a:rPr lang="en-US"/>
               <a:t>Click to edit Master text styles</a:t>
             </a:r>
           </a:p>
           <a:p>
             <a:pPr lvl="1"/>
             <a:r>
-              <a:rPr lang="en-US" smtClean="0"/>
+              <a:rPr lang="en-US"/>
               <a:t>Second level</a:t>
             </a:r>
           </a:p>
           <a:p>
             <a:pPr lvl="2"/>
             <a:r>
-              <a:rPr lang="en-US" smtClean="0"/>
+              <a:rPr lang="en-US"/>
               <a:t>Third level</a:t>
             </a:r>
           </a:p>
           <a:p>
             <a:pPr lvl="3"/>
             <a:r>
-              <a:rPr lang="en-US" smtClean="0"/>
+              <a:rPr lang="en-US"/>
               <a:t>Fourth level</a:t>
             </a:r>
           </a:p>
           <a:p>
             <a:pPr lvl="4"/>
             <a:r>
-              <a:rPr lang="en-US" smtClean="0"/>
+              <a:rPr lang="en-US"/>
               <a:t>Fifth level</a:t>
             </a:r>
-            <a:endParaRPr lang="en-US"/>
           </a:p>
         </p:txBody>
       </p:sp>
@@ -1695,7 +1698,7 @@
           <a:p>
             <a:fld id="{78C97017-6FC3-485B-9764-EAC9E56C1D49}" type="datetimeFigureOut">
               <a:rPr lang="en-US" smtClean="0"/>
-              <a:t>10/16/2016</a:t>
+              <a:t>11/11/2018</a:t>
             </a:fld>
             <a:endParaRPr lang="en-US"/>
           </a:p>
@@ -1793,10 +1796,9 @@
           </a:lstStyle>
           <a:p>
             <a:r>
-              <a:rPr lang="en-US" smtClean="0"/>
+              <a:rPr lang="en-US"/>
               <a:t>Click to edit Master title style</a:t>
             </a:r>
-            <a:endParaRPr lang="en-US"/>
           </a:p>
         </p:txBody>
       </p:sp>
@@ -1859,7 +1861,7 @@
           <a:p>
             <a:pPr lvl="0"/>
             <a:r>
-              <a:rPr lang="en-US" smtClean="0"/>
+              <a:rPr lang="en-US"/>
               <a:t>Click to edit Master text styles</a:t>
             </a:r>
           </a:p>
@@ -1915,38 +1917,37 @@
           <a:p>
             <a:pPr lvl="0"/>
             <a:r>
-              <a:rPr lang="en-US" smtClean="0"/>
+              <a:rPr lang="en-US"/>
               <a:t>Click to edit Master text styles</a:t>
             </a:r>
           </a:p>
           <a:p>
             <a:pPr lvl="1"/>
             <a:r>
-              <a:rPr lang="en-US" smtClean="0"/>
+              <a:rPr lang="en-US"/>
               <a:t>Second level</a:t>
             </a:r>
           </a:p>
           <a:p>
             <a:pPr lvl="2"/>
             <a:r>
-              <a:rPr lang="en-US" smtClean="0"/>
+              <a:rPr lang="en-US"/>
               <a:t>Third level</a:t>
             </a:r>
           </a:p>
           <a:p>
             <a:pPr lvl="3"/>
             <a:r>
-              <a:rPr lang="en-US" smtClean="0"/>
+              <a:rPr lang="en-US"/>
               <a:t>Fourth level</a:t>
             </a:r>
           </a:p>
           <a:p>
             <a:pPr lvl="4"/>
             <a:r>
-              <a:rPr lang="en-US" smtClean="0"/>
+              <a:rPr lang="en-US"/>
               <a:t>Fifth level</a:t>
             </a:r>
-            <a:endParaRPr lang="en-US"/>
           </a:p>
         </p:txBody>
       </p:sp>
@@ -2009,7 +2010,7 @@
           <a:p>
             <a:pPr lvl="0"/>
             <a:r>
-              <a:rPr lang="en-US" smtClean="0"/>
+              <a:rPr lang="en-US"/>
               <a:t>Click to edit Master text styles</a:t>
             </a:r>
           </a:p>
@@ -2065,38 +2066,37 @@
           <a:p>
             <a:pPr lvl="0"/>
             <a:r>
-              <a:rPr lang="en-US" smtClean="0"/>
+              <a:rPr lang="en-US"/>
               <a:t>Click to edit Master text styles</a:t>
             </a:r>
           </a:p>
           <a:p>
             <a:pPr lvl="1"/>
             <a:r>
-              <a:rPr lang="en-US" smtClean="0"/>
+              <a:rPr lang="en-US"/>
               <a:t>Second level</a:t>
             </a:r>
           </a:p>
           <a:p>
             <a:pPr lvl="2"/>
             <a:r>
-              <a:rPr lang="en-US" smtClean="0"/>
+              <a:rPr lang="en-US"/>
               <a:t>Third level</a:t>
             </a:r>
           </a:p>
           <a:p>
             <a:pPr lvl="3"/>
             <a:r>
-              <a:rPr lang="en-US" smtClean="0"/>
+              <a:rPr lang="en-US"/>
               <a:t>Fourth level</a:t>
             </a:r>
           </a:p>
           <a:p>
             <a:pPr lvl="4"/>
             <a:r>
-              <a:rPr lang="en-US" smtClean="0"/>
+              <a:rPr lang="en-US"/>
               <a:t>Fifth level</a:t>
             </a:r>
-            <a:endParaRPr lang="en-US"/>
           </a:p>
         </p:txBody>
       </p:sp>
@@ -2117,7 +2117,7 @@
           <a:p>
             <a:fld id="{78C97017-6FC3-485B-9764-EAC9E56C1D49}" type="datetimeFigureOut">
               <a:rPr lang="en-US" smtClean="0"/>
-              <a:t>10/16/2016</a:t>
+              <a:t>11/11/2018</a:t>
             </a:fld>
             <a:endParaRPr lang="en-US"/>
           </a:p>
@@ -2211,10 +2211,9 @@
           <a:lstStyle/>
           <a:p>
             <a:r>
-              <a:rPr lang="en-US" smtClean="0"/>
+              <a:rPr lang="en-US"/>
               <a:t>Click to edit Master title style</a:t>
             </a:r>
-            <a:endParaRPr lang="en-US"/>
           </a:p>
         </p:txBody>
       </p:sp>
@@ -2235,7 +2234,7 @@
           <a:p>
             <a:fld id="{78C97017-6FC3-485B-9764-EAC9E56C1D49}" type="datetimeFigureOut">
               <a:rPr lang="en-US" smtClean="0"/>
-              <a:t>10/16/2016</a:t>
+              <a:t>11/11/2018</a:t>
             </a:fld>
             <a:endParaRPr lang="en-US"/>
           </a:p>
@@ -2330,7 +2329,7 @@
           <a:p>
             <a:fld id="{78C97017-6FC3-485B-9764-EAC9E56C1D49}" type="datetimeFigureOut">
               <a:rPr lang="en-US" smtClean="0"/>
-              <a:t>10/16/2016</a:t>
+              <a:t>11/11/2018</a:t>
             </a:fld>
             <a:endParaRPr lang="en-US"/>
           </a:p>
@@ -2433,10 +2432,9 @@
           </a:lstStyle>
           <a:p>
             <a:r>
-              <a:rPr lang="en-US" smtClean="0"/>
+              <a:rPr lang="en-US"/>
               <a:t>Click to edit Master title style</a:t>
             </a:r>
-            <a:endParaRPr lang="en-US"/>
           </a:p>
         </p:txBody>
       </p:sp>
@@ -2490,38 +2488,37 @@
           <a:p>
             <a:pPr lvl="0"/>
             <a:r>
-              <a:rPr lang="en-US" smtClean="0"/>
+              <a:rPr lang="en-US"/>
               <a:t>Click to edit Master text styles</a:t>
             </a:r>
           </a:p>
           <a:p>
             <a:pPr lvl="1"/>
             <a:r>
-              <a:rPr lang="en-US" smtClean="0"/>
+              <a:rPr lang="en-US"/>
               <a:t>Second level</a:t>
             </a:r>
           </a:p>
           <a:p>
             <a:pPr lvl="2"/>
             <a:r>
-              <a:rPr lang="en-US" smtClean="0"/>
+              <a:rPr lang="en-US"/>
               <a:t>Third level</a:t>
             </a:r>
           </a:p>
           <a:p>
             <a:pPr lvl="3"/>
             <a:r>
-              <a:rPr lang="en-US" smtClean="0"/>
+              <a:rPr lang="en-US"/>
               <a:t>Fourth level</a:t>
             </a:r>
           </a:p>
           <a:p>
             <a:pPr lvl="4"/>
             <a:r>
-              <a:rPr lang="en-US" smtClean="0"/>
+              <a:rPr lang="en-US"/>
               <a:t>Fifth level</a:t>
             </a:r>
-            <a:endParaRPr lang="en-US"/>
           </a:p>
         </p:txBody>
       </p:sp>
@@ -2584,7 +2581,7 @@
           <a:p>
             <a:pPr lvl="0"/>
             <a:r>
-              <a:rPr lang="en-US" smtClean="0"/>
+              <a:rPr lang="en-US"/>
               <a:t>Click to edit Master text styles</a:t>
             </a:r>
           </a:p>
@@ -2607,7 +2604,7 @@
           <a:p>
             <a:fld id="{78C97017-6FC3-485B-9764-EAC9E56C1D49}" type="datetimeFigureOut">
               <a:rPr lang="en-US" smtClean="0"/>
-              <a:t>10/16/2016</a:t>
+              <a:t>11/11/2018</a:t>
             </a:fld>
             <a:endParaRPr lang="en-US"/>
           </a:p>
@@ -2710,10 +2707,9 @@
           </a:lstStyle>
           <a:p>
             <a:r>
-              <a:rPr lang="en-US" smtClean="0"/>
+              <a:rPr lang="en-US"/>
               <a:t>Click to edit Master title style</a:t>
             </a:r>
-            <a:endParaRPr lang="en-US"/>
           </a:p>
         </p:txBody>
       </p:sp>
@@ -2837,7 +2833,7 @@
           <a:p>
             <a:pPr lvl="0"/>
             <a:r>
-              <a:rPr lang="en-US" smtClean="0"/>
+              <a:rPr lang="en-US"/>
               <a:t>Click to edit Master text styles</a:t>
             </a:r>
           </a:p>
@@ -2860,7 +2856,7 @@
           <a:p>
             <a:fld id="{78C97017-6FC3-485B-9764-EAC9E56C1D49}" type="datetimeFigureOut">
               <a:rPr lang="en-US" smtClean="0"/>
-              <a:t>10/16/2016</a:t>
+              <a:t>11/11/2018</a:t>
             </a:fld>
             <a:endParaRPr lang="en-US"/>
           </a:p>
@@ -2969,10 +2965,9 @@
           <a:lstStyle/>
           <a:p>
             <a:r>
-              <a:rPr lang="en-US" smtClean="0"/>
+              <a:rPr lang="en-US"/>
               <a:t>Click to edit Master title style</a:t>
             </a:r>
-            <a:endParaRPr lang="en-US"/>
           </a:p>
         </p:txBody>
       </p:sp>
@@ -3003,38 +2998,37 @@
           <a:p>
             <a:pPr lvl="0"/>
             <a:r>
-              <a:rPr lang="en-US" smtClean="0"/>
+              <a:rPr lang="en-US"/>
               <a:t>Click to edit Master text styles</a:t>
             </a:r>
           </a:p>
           <a:p>
             <a:pPr lvl="1"/>
             <a:r>
-              <a:rPr lang="en-US" smtClean="0"/>
+              <a:rPr lang="en-US"/>
               <a:t>Second level</a:t>
             </a:r>
           </a:p>
           <a:p>
             <a:pPr lvl="2"/>
             <a:r>
-              <a:rPr lang="en-US" smtClean="0"/>
+              <a:rPr lang="en-US"/>
               <a:t>Third level</a:t>
             </a:r>
           </a:p>
           <a:p>
             <a:pPr lvl="3"/>
             <a:r>
-              <a:rPr lang="en-US" smtClean="0"/>
+              <a:rPr lang="en-US"/>
               <a:t>Fourth level</a:t>
             </a:r>
           </a:p>
           <a:p>
             <a:pPr lvl="4"/>
             <a:r>
-              <a:rPr lang="en-US" smtClean="0"/>
+              <a:rPr lang="en-US"/>
               <a:t>Fifth level</a:t>
             </a:r>
-            <a:endParaRPr lang="en-US"/>
           </a:p>
         </p:txBody>
       </p:sp>
@@ -3073,7 +3067,7 @@
           <a:p>
             <a:fld id="{78C97017-6FC3-485B-9764-EAC9E56C1D49}" type="datetimeFigureOut">
               <a:rPr lang="en-US" smtClean="0"/>
-              <a:t>10/16/2016</a:t>
+              <a:t>11/11/2018</a:t>
             </a:fld>
             <a:endParaRPr lang="en-US"/>
           </a:p>
@@ -3456,8 +3450,8 @@
         </p:nvSpPr>
         <p:spPr>
           <a:xfrm>
-            <a:off x="1119865" y="2086382"/>
-            <a:ext cx="7871735" cy="1723618"/>
+            <a:off x="533400" y="1905000"/>
+            <a:ext cx="8176535" cy="3423280"/>
           </a:xfrm>
           <a:prstGeom prst="roundRect">
             <a:avLst>
@@ -3494,7 +3488,7 @@
           <a:lstStyle/>
           <a:p>
             <a:r>
-              <a:rPr lang="en-US" sz="1200" b="1" dirty="0" smtClean="0">
+              <a:rPr lang="en-US" sz="1200" b="1" dirty="0">
                 <a:solidFill>
                   <a:schemeClr val="accent6">
                     <a:lumMod val="75000"/>
@@ -3515,14 +3509,14 @@
       </p:sp>
       <p:sp>
         <p:nvSpPr>
-          <p:cNvPr id="2" name="Rectangle 8"/>
+          <p:cNvPr id="9" name="Rectangle 62"/>
           <p:cNvSpPr/>
           <p:nvPr/>
         </p:nvSpPr>
         <p:spPr>
-          <a:xfrm>
-            <a:off x="2877180" y="3158440"/>
-            <a:ext cx="1323049" cy="346760"/>
+          <a:xfrm rot="16200000">
+            <a:off x="248554" y="3536249"/>
+            <a:ext cx="2791524" cy="346760"/>
           </a:xfrm>
           <a:prstGeom prst="rect">
             <a:avLst/>
@@ -3561,27 +3555,12 @@
           <a:p>
             <a:pPr algn="ctr"/>
             <a:r>
-              <a:rPr lang="en-US" sz="1050" dirty="0" smtClean="0">
+              <a:rPr lang="en-US" sz="1050" dirty="0" err="1">
                 <a:solidFill>
                   <a:schemeClr val="bg1"/>
                 </a:solidFill>
               </a:rPr>
-              <a:t>&lt;&lt;interface&gt;&gt;</a:t>
-            </a:r>
-            <a:br>
-              <a:rPr lang="en-US" sz="1050" dirty="0" smtClean="0">
-                <a:solidFill>
-                  <a:schemeClr val="bg1"/>
-                </a:solidFill>
-              </a:rPr>
-            </a:br>
-            <a:r>
-              <a:rPr lang="en-US" sz="1050" dirty="0" err="1" smtClean="0">
-                <a:solidFill>
-                  <a:schemeClr val="bg1"/>
-                </a:solidFill>
-              </a:rPr>
-              <a:t>AddressBookStorage</a:t>
+              <a:t>StorageManager</a:t>
             </a:r>
             <a:endParaRPr lang="en-SG" sz="1050" dirty="0">
               <a:solidFill>
@@ -3593,14 +3572,14 @@
       </p:sp>
       <p:sp>
         <p:nvSpPr>
-          <p:cNvPr id="9" name="Rectangle 62"/>
+          <p:cNvPr id="119" name="Rectangle 62"/>
           <p:cNvSpPr/>
           <p:nvPr/>
         </p:nvSpPr>
         <p:spPr>
           <a:xfrm rot="16200000">
-            <a:off x="1683963" y="2868687"/>
-            <a:ext cx="1093635" cy="346760"/>
+            <a:off x="-482950" y="3532507"/>
+            <a:ext cx="2799010" cy="346760"/>
           </a:xfrm>
           <a:prstGeom prst="rect">
             <a:avLst/>
@@ -3639,69 +3618,6 @@
           <a:p>
             <a:pPr algn="ctr"/>
             <a:r>
-              <a:rPr lang="en-US" sz="1050" dirty="0" err="1" smtClean="0">
-                <a:solidFill>
-                  <a:schemeClr val="bg1"/>
-                </a:solidFill>
-              </a:rPr>
-              <a:t>StorageManager</a:t>
-            </a:r>
-            <a:endParaRPr lang="en-SG" sz="1050" dirty="0">
-              <a:solidFill>
-                <a:schemeClr val="bg1"/>
-              </a:solidFill>
-            </a:endParaRPr>
-          </a:p>
-        </p:txBody>
-      </p:sp>
-      <p:sp>
-        <p:nvSpPr>
-          <p:cNvPr id="119" name="Rectangle 62"/>
-          <p:cNvSpPr/>
-          <p:nvPr/>
-        </p:nvSpPr>
-        <p:spPr>
-          <a:xfrm rot="16200000">
-            <a:off x="956202" y="2861202"/>
-            <a:ext cx="1093635" cy="346760"/>
-          </a:xfrm>
-          <a:prstGeom prst="rect">
-            <a:avLst/>
-          </a:prstGeom>
-          <a:solidFill>
-            <a:schemeClr val="accent6">
-              <a:lumMod val="75000"/>
-            </a:schemeClr>
-          </a:solidFill>
-          <a:ln w="19050">
-            <a:solidFill>
-              <a:schemeClr val="accent6">
-                <a:lumMod val="75000"/>
-              </a:schemeClr>
-            </a:solidFill>
-          </a:ln>
-          <a:effectLst/>
-        </p:spPr>
-        <p:style>
-          <a:lnRef idx="1">
-            <a:schemeClr val="accent2"/>
-          </a:lnRef>
-          <a:fillRef idx="2">
-            <a:schemeClr val="accent2"/>
-          </a:fillRef>
-          <a:effectRef idx="1">
-            <a:schemeClr val="accent2"/>
-          </a:effectRef>
-          <a:fontRef idx="minor">
-            <a:schemeClr val="dk1"/>
-          </a:fontRef>
-        </p:style>
-        <p:txBody>
-          <a:bodyPr rtlCol="0" anchor="ctr"/>
-          <a:lstStyle/>
-          <a:p>
-            <a:pPr algn="ctr"/>
-            <a:r>
               <a:rPr lang="en-US" sz="1050" dirty="0">
                 <a:solidFill>
                   <a:schemeClr val="bg1"/>
@@ -3713,7 +3629,7 @@
           <a:p>
             <a:pPr algn="ctr"/>
             <a:r>
-              <a:rPr lang="en-US" sz="1050" dirty="0" smtClean="0">
+              <a:rPr lang="en-US" sz="1050" dirty="0">
                 <a:solidFill>
                   <a:schemeClr val="bg1"/>
                 </a:solidFill>
@@ -3736,7 +3652,7 @@
         </p:nvSpPr>
         <p:spPr>
           <a:xfrm rot="16200000">
-            <a:off x="1626910" y="2952291"/>
+            <a:off x="1029491" y="3594250"/>
             <a:ext cx="270504" cy="175523"/>
           </a:xfrm>
           <a:prstGeom prst="triangle">
@@ -3785,56 +3701,13 @@
       </p:sp>
       <p:cxnSp>
         <p:nvCxnSpPr>
-          <p:cNvPr id="58" name="Straight Arrow Connector 57"/>
-          <p:cNvCxnSpPr>
-            <a:stCxn id="42" idx="3"/>
-            <a:endCxn id="2" idx="1"/>
-          </p:cNvCxnSpPr>
-          <p:nvPr/>
-        </p:nvCxnSpPr>
-        <p:spPr>
-          <a:xfrm>
-            <a:off x="2656370" y="3326536"/>
-            <a:ext cx="220810" cy="5284"/>
-          </a:xfrm>
-          <a:prstGeom prst="straightConnector1">
-            <a:avLst/>
-          </a:prstGeom>
-          <a:ln w="19050">
-            <a:solidFill>
-              <a:schemeClr val="accent6">
-                <a:lumMod val="75000"/>
-              </a:schemeClr>
-            </a:solidFill>
-            <a:headEnd type="none" w="med" len="med"/>
-            <a:tailEnd type="arrow" w="med" len="med"/>
-          </a:ln>
-          <a:effectLst/>
-        </p:spPr>
-        <p:style>
-          <a:lnRef idx="1">
-            <a:schemeClr val="accent2"/>
-          </a:lnRef>
-          <a:fillRef idx="2">
-            <a:schemeClr val="accent2"/>
-          </a:fillRef>
-          <a:effectRef idx="1">
-            <a:schemeClr val="accent2"/>
-          </a:effectRef>
-          <a:fontRef idx="minor">
-            <a:schemeClr val="dk1"/>
-          </a:fontRef>
-        </p:style>
-      </p:cxnSp>
-      <p:cxnSp>
-        <p:nvCxnSpPr>
           <p:cNvPr id="75" name="Elbow Connector 122"/>
           <p:cNvCxnSpPr/>
           <p:nvPr/>
         </p:nvCxnSpPr>
         <p:spPr>
           <a:xfrm>
-            <a:off x="910091" y="3040053"/>
+            <a:off x="323626" y="2858671"/>
             <a:ext cx="419548" cy="2860"/>
           </a:xfrm>
           <a:prstGeom prst="bentConnector3">
@@ -3879,7 +3752,7 @@
         </p:nvCxnSpPr>
         <p:spPr>
           <a:xfrm flipV="1">
-            <a:off x="1849924" y="3040052"/>
+            <a:off x="1252505" y="3682011"/>
             <a:ext cx="216105" cy="1"/>
           </a:xfrm>
           <a:prstGeom prst="line">
@@ -3912,15 +3785,1565 @@
           </a:fontRef>
         </p:style>
       </p:cxnSp>
-      <p:sp>
-        <p:nvSpPr>
-          <p:cNvPr id="42" name="Flowchart: Decision 96"/>
+      <p:grpSp>
+        <p:nvGrpSpPr>
+          <p:cNvPr id="64" name="Group 63">
+            <a:extLst>
+              <a:ext uri="{FF2B5EF4-FFF2-40B4-BE49-F238E27FC236}">
+                <a16:creationId xmlns:a16="http://schemas.microsoft.com/office/drawing/2014/main" id="{1A718851-9DAD-497B-B64A-90DD59C38334}"/>
+              </a:ext>
+            </a:extLst>
+          </p:cNvPr>
+          <p:cNvGrpSpPr/>
+          <p:nvPr/>
+        </p:nvGrpSpPr>
+        <p:grpSpPr>
+          <a:xfrm>
+            <a:off x="1817697" y="2054145"/>
+            <a:ext cx="6455134" cy="2943970"/>
+            <a:chOff x="1833857" y="2367458"/>
+            <a:chExt cx="6455134" cy="2943970"/>
+          </a:xfrm>
+        </p:grpSpPr>
+        <p:sp>
+          <p:nvSpPr>
+            <p:cNvPr id="2" name="Rectangle 8"/>
+            <p:cNvSpPr/>
+            <p:nvPr/>
+          </p:nvSpPr>
+          <p:spPr>
+            <a:xfrm>
+              <a:off x="2290715" y="2977058"/>
+              <a:ext cx="1323049" cy="346760"/>
+            </a:xfrm>
+            <a:prstGeom prst="rect">
+              <a:avLst/>
+            </a:prstGeom>
+            <a:solidFill>
+              <a:schemeClr val="accent6">
+                <a:lumMod val="75000"/>
+              </a:schemeClr>
+            </a:solidFill>
+            <a:ln w="19050">
+              <a:solidFill>
+                <a:schemeClr val="accent6">
+                  <a:lumMod val="75000"/>
+                </a:schemeClr>
+              </a:solidFill>
+            </a:ln>
+            <a:effectLst/>
+          </p:spPr>
+          <p:style>
+            <a:lnRef idx="1">
+              <a:schemeClr val="accent2"/>
+            </a:lnRef>
+            <a:fillRef idx="2">
+              <a:schemeClr val="accent2"/>
+            </a:fillRef>
+            <a:effectRef idx="1">
+              <a:schemeClr val="accent2"/>
+            </a:effectRef>
+            <a:fontRef idx="minor">
+              <a:schemeClr val="dk1"/>
+            </a:fontRef>
+          </p:style>
+          <p:txBody>
+            <a:bodyPr rtlCol="0" anchor="ctr"/>
+            <a:lstStyle/>
+            <a:p>
+              <a:pPr algn="ctr"/>
+              <a:r>
+                <a:rPr lang="en-US" sz="1050" dirty="0">
+                  <a:solidFill>
+                    <a:schemeClr val="bg1"/>
+                  </a:solidFill>
+                </a:rPr>
+                <a:t>&lt;&lt;interface&gt;&gt;</a:t>
+              </a:r>
+              <a:br>
+                <a:rPr lang="en-US" sz="1050" dirty="0">
+                  <a:solidFill>
+                    <a:schemeClr val="bg1"/>
+                  </a:solidFill>
+                </a:rPr>
+              </a:br>
+              <a:r>
+                <a:rPr lang="en-US" sz="1050" dirty="0" err="1">
+                  <a:solidFill>
+                    <a:schemeClr val="bg1"/>
+                  </a:solidFill>
+                </a:rPr>
+                <a:t>ConciergeStorage</a:t>
+              </a:r>
+              <a:endParaRPr lang="en-SG" sz="1050" dirty="0">
+                <a:solidFill>
+                  <a:schemeClr val="bg1"/>
+                </a:solidFill>
+              </a:endParaRPr>
+            </a:p>
+          </p:txBody>
+        </p:sp>
+        <p:cxnSp>
+          <p:nvCxnSpPr>
+            <p:cNvPr id="58" name="Straight Arrow Connector 57"/>
+            <p:cNvCxnSpPr>
+              <a:stCxn id="42" idx="3"/>
+              <a:endCxn id="2" idx="1"/>
+            </p:cNvCxnSpPr>
+            <p:nvPr/>
+          </p:nvCxnSpPr>
+          <p:spPr>
+            <a:xfrm>
+              <a:off x="2069905" y="3145154"/>
+              <a:ext cx="220810" cy="5284"/>
+            </a:xfrm>
+            <a:prstGeom prst="straightConnector1">
+              <a:avLst/>
+            </a:prstGeom>
+            <a:ln w="19050">
+              <a:solidFill>
+                <a:schemeClr val="accent6">
+                  <a:lumMod val="75000"/>
+                </a:schemeClr>
+              </a:solidFill>
+              <a:headEnd type="none" w="med" len="med"/>
+              <a:tailEnd type="arrow" w="med" len="med"/>
+            </a:ln>
+            <a:effectLst/>
+          </p:spPr>
+          <p:style>
+            <a:lnRef idx="1">
+              <a:schemeClr val="accent2"/>
+            </a:lnRef>
+            <a:fillRef idx="2">
+              <a:schemeClr val="accent2"/>
+            </a:fillRef>
+            <a:effectRef idx="1">
+              <a:schemeClr val="accent2"/>
+            </a:effectRef>
+            <a:fontRef idx="minor">
+              <a:schemeClr val="dk1"/>
+            </a:fontRef>
+          </p:style>
+        </p:cxnSp>
+        <p:sp>
+          <p:nvSpPr>
+            <p:cNvPr id="42" name="Flowchart: Decision 96"/>
+            <p:cNvSpPr/>
+            <p:nvPr/>
+          </p:nvSpPr>
+          <p:spPr>
+            <a:xfrm>
+              <a:off x="1833857" y="3058464"/>
+              <a:ext cx="236048" cy="173380"/>
+            </a:xfrm>
+            <a:prstGeom prst="flowChartDecision">
+              <a:avLst/>
+            </a:prstGeom>
+            <a:noFill/>
+            <a:ln w="19050">
+              <a:solidFill>
+                <a:schemeClr val="accent6">
+                  <a:lumMod val="75000"/>
+                </a:schemeClr>
+              </a:solidFill>
+            </a:ln>
+            <a:effectLst/>
+          </p:spPr>
+          <p:style>
+            <a:lnRef idx="1">
+              <a:schemeClr val="accent2"/>
+            </a:lnRef>
+            <a:fillRef idx="2">
+              <a:schemeClr val="accent2"/>
+            </a:fillRef>
+            <a:effectRef idx="1">
+              <a:schemeClr val="accent2"/>
+            </a:effectRef>
+            <a:fontRef idx="minor">
+              <a:schemeClr val="dk1"/>
+            </a:fontRef>
+          </p:style>
+          <p:txBody>
+            <a:bodyPr rtlCol="0" anchor="ctr"/>
+            <a:lstStyle/>
+            <a:p>
+              <a:pPr algn="ctr"/>
+              <a:endParaRPr lang="en-US" sz="1050">
+                <a:solidFill>
+                  <a:schemeClr val="bg1"/>
+                </a:solidFill>
+              </a:endParaRPr>
+            </a:p>
+          </p:txBody>
+        </p:sp>
+        <p:cxnSp>
+          <p:nvCxnSpPr>
+            <p:cNvPr id="97" name="Elbow Connector 63"/>
+            <p:cNvCxnSpPr>
+              <a:stCxn id="99" idx="3"/>
+              <a:endCxn id="50" idx="1"/>
+            </p:cNvCxnSpPr>
+            <p:nvPr/>
+          </p:nvCxnSpPr>
+          <p:spPr>
+            <a:xfrm flipV="1">
+              <a:off x="3811576" y="3150438"/>
+              <a:ext cx="223324" cy="1"/>
+            </a:xfrm>
+            <a:prstGeom prst="bentConnector3">
+              <a:avLst>
+                <a:gd name="adj1" fmla="val 50000"/>
+              </a:avLst>
+            </a:prstGeom>
+            <a:ln w="19050">
+              <a:solidFill>
+                <a:schemeClr val="accent6">
+                  <a:lumMod val="75000"/>
+                </a:schemeClr>
+              </a:solidFill>
+              <a:prstDash val="sysDot"/>
+              <a:headEnd type="none" w="med" len="med"/>
+              <a:tailEnd type="none" w="med" len="med"/>
+            </a:ln>
+            <a:effectLst/>
+          </p:spPr>
+          <p:style>
+            <a:lnRef idx="1">
+              <a:schemeClr val="accent2"/>
+            </a:lnRef>
+            <a:fillRef idx="2">
+              <a:schemeClr val="accent2"/>
+            </a:fillRef>
+            <a:effectRef idx="1">
+              <a:schemeClr val="accent2"/>
+            </a:effectRef>
+            <a:fontRef idx="minor">
+              <a:schemeClr val="dk1"/>
+            </a:fontRef>
+          </p:style>
+        </p:cxnSp>
+        <p:sp>
+          <p:nvSpPr>
+            <p:cNvPr id="99" name="Isosceles Triangle 102"/>
+            <p:cNvSpPr/>
+            <p:nvPr/>
+          </p:nvSpPr>
+          <p:spPr>
+            <a:xfrm rot="5400000" flipV="1">
+              <a:off x="3588562" y="3062677"/>
+              <a:ext cx="270504" cy="175523"/>
+            </a:xfrm>
+            <a:prstGeom prst="triangle">
+              <a:avLst/>
+            </a:prstGeom>
+            <a:solidFill>
+              <a:schemeClr val="accent6">
+                <a:lumMod val="75000"/>
+              </a:schemeClr>
+            </a:solidFill>
+            <a:ln w="19050">
+              <a:solidFill>
+                <a:schemeClr val="accent6">
+                  <a:lumMod val="75000"/>
+                </a:schemeClr>
+              </a:solidFill>
+            </a:ln>
+            <a:effectLst/>
+          </p:spPr>
+          <p:style>
+            <a:lnRef idx="1">
+              <a:schemeClr val="accent2"/>
+            </a:lnRef>
+            <a:fillRef idx="2">
+              <a:schemeClr val="accent2"/>
+            </a:fillRef>
+            <a:effectRef idx="1">
+              <a:schemeClr val="accent2"/>
+            </a:effectRef>
+            <a:fontRef idx="minor">
+              <a:schemeClr val="dk1"/>
+            </a:fontRef>
+          </p:style>
+          <p:txBody>
+            <a:bodyPr rtlCol="0" anchor="ctr"/>
+            <a:lstStyle/>
+            <a:p>
+              <a:pPr algn="ctr"/>
+              <a:endParaRPr lang="en-SG" sz="1050">
+                <a:solidFill>
+                  <a:schemeClr val="bg1"/>
+                </a:solidFill>
+              </a:endParaRPr>
+            </a:p>
+          </p:txBody>
+        </p:sp>
+        <p:cxnSp>
+          <p:nvCxnSpPr>
+            <p:cNvPr id="124" name="Elbow Connector 122"/>
+            <p:cNvCxnSpPr>
+              <a:stCxn id="50" idx="3"/>
+              <a:endCxn id="66" idx="1"/>
+            </p:cNvCxnSpPr>
+            <p:nvPr/>
+          </p:nvCxnSpPr>
+          <p:spPr>
+            <a:xfrm>
+              <a:off x="5204735" y="3150438"/>
+              <a:ext cx="228600" cy="1970"/>
+            </a:xfrm>
+            <a:prstGeom prst="bentConnector3">
+              <a:avLst>
+                <a:gd name="adj1" fmla="val 50000"/>
+              </a:avLst>
+            </a:prstGeom>
+            <a:ln w="19050">
+              <a:solidFill>
+                <a:schemeClr val="accent6">
+                  <a:lumMod val="75000"/>
+                </a:schemeClr>
+              </a:solidFill>
+              <a:prstDash val="sysDot"/>
+              <a:headEnd type="none" w="med" len="med"/>
+              <a:tailEnd type="arrow" w="med" len="med"/>
+            </a:ln>
+            <a:effectLst/>
+          </p:spPr>
+          <p:style>
+            <a:lnRef idx="1">
+              <a:schemeClr val="accent2"/>
+            </a:lnRef>
+            <a:fillRef idx="2">
+              <a:schemeClr val="accent2"/>
+            </a:fillRef>
+            <a:effectRef idx="1">
+              <a:schemeClr val="accent2"/>
+            </a:effectRef>
+            <a:fontRef idx="minor">
+              <a:schemeClr val="dk1"/>
+            </a:fontRef>
+          </p:style>
+        </p:cxnSp>
+        <p:sp>
+          <p:nvSpPr>
+            <p:cNvPr id="50" name="Rectangle 8"/>
+            <p:cNvSpPr/>
+            <p:nvPr/>
+          </p:nvSpPr>
+          <p:spPr>
+            <a:xfrm>
+              <a:off x="4034900" y="2977058"/>
+              <a:ext cx="1169835" cy="346760"/>
+            </a:xfrm>
+            <a:prstGeom prst="rect">
+              <a:avLst/>
+            </a:prstGeom>
+            <a:ln w="19050"/>
+            <a:effectLst/>
+          </p:spPr>
+          <p:style>
+            <a:lnRef idx="1">
+              <a:schemeClr val="accent6"/>
+            </a:lnRef>
+            <a:fillRef idx="2">
+              <a:schemeClr val="accent6"/>
+            </a:fillRef>
+            <a:effectRef idx="1">
+              <a:schemeClr val="accent6"/>
+            </a:effectRef>
+            <a:fontRef idx="minor">
+              <a:schemeClr val="dk1"/>
+            </a:fontRef>
+          </p:style>
+          <p:txBody>
+            <a:bodyPr rtlCol="0" anchor="ctr"/>
+            <a:lstStyle/>
+            <a:p>
+              <a:pPr algn="ctr"/>
+              <a:r>
+                <a:rPr lang="en-US" sz="1050" b="1" dirty="0" err="1">
+                  <a:solidFill>
+                    <a:schemeClr val="accent6">
+                      <a:lumMod val="75000"/>
+                    </a:schemeClr>
+                  </a:solidFill>
+                </a:rPr>
+                <a:t>XmlConcierge</a:t>
+              </a:r>
+              <a:br>
+                <a:rPr lang="en-US" sz="1050" b="1" dirty="0">
+                  <a:solidFill>
+                    <a:schemeClr val="accent6">
+                      <a:lumMod val="75000"/>
+                    </a:schemeClr>
+                  </a:solidFill>
+                </a:rPr>
+              </a:br>
+              <a:r>
+                <a:rPr lang="en-US" sz="1050" b="1" dirty="0">
+                  <a:solidFill>
+                    <a:schemeClr val="accent6">
+                      <a:lumMod val="75000"/>
+                    </a:schemeClr>
+                  </a:solidFill>
+                </a:rPr>
+                <a:t>Storage</a:t>
+              </a:r>
+              <a:endParaRPr lang="en-SG" sz="1050" b="1" dirty="0">
+                <a:solidFill>
+                  <a:schemeClr val="accent6">
+                    <a:lumMod val="75000"/>
+                  </a:schemeClr>
+                </a:solidFill>
+              </a:endParaRPr>
+            </a:p>
+          </p:txBody>
+        </p:sp>
+        <p:sp>
+          <p:nvSpPr>
+            <p:cNvPr id="66" name="Rectangle 8"/>
+            <p:cNvSpPr/>
+            <p:nvPr/>
+          </p:nvSpPr>
+          <p:spPr>
+            <a:xfrm>
+              <a:off x="5433335" y="2979028"/>
+              <a:ext cx="1200707" cy="346760"/>
+            </a:xfrm>
+            <a:prstGeom prst="rect">
+              <a:avLst/>
+            </a:prstGeom>
+            <a:ln w="19050"/>
+            <a:effectLst/>
+          </p:spPr>
+          <p:style>
+            <a:lnRef idx="1">
+              <a:schemeClr val="accent6"/>
+            </a:lnRef>
+            <a:fillRef idx="2">
+              <a:schemeClr val="accent6"/>
+            </a:fillRef>
+            <a:effectRef idx="1">
+              <a:schemeClr val="accent6"/>
+            </a:effectRef>
+            <a:fontRef idx="minor">
+              <a:schemeClr val="dk1"/>
+            </a:fontRef>
+          </p:style>
+          <p:txBody>
+            <a:bodyPr rtlCol="0" anchor="ctr"/>
+            <a:lstStyle/>
+            <a:p>
+              <a:pPr algn="ctr"/>
+              <a:r>
+                <a:rPr lang="en-US" sz="1050" b="1" dirty="0" err="1">
+                  <a:solidFill>
+                    <a:schemeClr val="accent6">
+                      <a:lumMod val="75000"/>
+                    </a:schemeClr>
+                  </a:solidFill>
+                </a:rPr>
+                <a:t>XmlSerializable</a:t>
+              </a:r>
+              <a:br>
+                <a:rPr lang="en-US" sz="1050" b="1" dirty="0">
+                  <a:solidFill>
+                    <a:schemeClr val="accent6">
+                      <a:lumMod val="75000"/>
+                    </a:schemeClr>
+                  </a:solidFill>
+                </a:rPr>
+              </a:br>
+              <a:r>
+                <a:rPr lang="en-US" sz="1050" b="1" dirty="0">
+                  <a:solidFill>
+                    <a:schemeClr val="accent6">
+                      <a:lumMod val="75000"/>
+                    </a:schemeClr>
+                  </a:solidFill>
+                </a:rPr>
+                <a:t>Concierge</a:t>
+              </a:r>
+              <a:endParaRPr lang="en-SG" sz="1050" b="1" dirty="0">
+                <a:solidFill>
+                  <a:schemeClr val="accent6">
+                    <a:lumMod val="75000"/>
+                  </a:schemeClr>
+                </a:solidFill>
+              </a:endParaRPr>
+            </a:p>
+          </p:txBody>
+        </p:sp>
+        <p:cxnSp>
+          <p:nvCxnSpPr>
+            <p:cNvPr id="70" name="Elbow Connector 122"/>
+            <p:cNvCxnSpPr>
+              <a:cxnSpLocks/>
+              <a:stCxn id="74" idx="2"/>
+              <a:endCxn id="73" idx="0"/>
+            </p:cNvCxnSpPr>
+            <p:nvPr/>
+          </p:nvCxnSpPr>
+          <p:spPr>
+            <a:xfrm rot="5400000">
+              <a:off x="7480623" y="3503503"/>
+              <a:ext cx="357010" cy="8"/>
+            </a:xfrm>
+            <a:prstGeom prst="bentConnector3">
+              <a:avLst>
+                <a:gd name="adj1" fmla="val 50000"/>
+              </a:avLst>
+            </a:prstGeom>
+            <a:ln w="19050">
+              <a:prstDash val="sysDot"/>
+              <a:headEnd type="none" w="med" len="med"/>
+              <a:tailEnd type="arrow" w="med" len="med"/>
+            </a:ln>
+            <a:effectLst/>
+          </p:spPr>
+          <p:style>
+            <a:lnRef idx="1">
+              <a:schemeClr val="accent6"/>
+            </a:lnRef>
+            <a:fillRef idx="2">
+              <a:schemeClr val="accent6"/>
+            </a:fillRef>
+            <a:effectRef idx="1">
+              <a:schemeClr val="accent6"/>
+            </a:effectRef>
+            <a:fontRef idx="minor">
+              <a:schemeClr val="dk1"/>
+            </a:fontRef>
+          </p:style>
+        </p:cxnSp>
+        <p:sp>
+          <p:nvSpPr>
+            <p:cNvPr id="73" name="Rectangle 8"/>
+            <p:cNvSpPr/>
+            <p:nvPr/>
+          </p:nvSpPr>
+          <p:spPr>
+            <a:xfrm>
+              <a:off x="7029265" y="3682012"/>
+              <a:ext cx="1259718" cy="346760"/>
+            </a:xfrm>
+            <a:prstGeom prst="rect">
+              <a:avLst/>
+            </a:prstGeom>
+            <a:ln w="19050"/>
+            <a:effectLst/>
+          </p:spPr>
+          <p:style>
+            <a:lnRef idx="1">
+              <a:schemeClr val="accent6"/>
+            </a:lnRef>
+            <a:fillRef idx="2">
+              <a:schemeClr val="accent6"/>
+            </a:fillRef>
+            <a:effectRef idx="1">
+              <a:schemeClr val="accent6"/>
+            </a:effectRef>
+            <a:fontRef idx="minor">
+              <a:schemeClr val="dk1"/>
+            </a:fontRef>
+          </p:style>
+          <p:txBody>
+            <a:bodyPr rtlCol="0" anchor="ctr"/>
+            <a:lstStyle/>
+            <a:p>
+              <a:pPr algn="ctr"/>
+              <a:r>
+                <a:rPr lang="en-US" sz="1050" b="1" dirty="0" err="1">
+                  <a:solidFill>
+                    <a:schemeClr val="accent6">
+                      <a:lumMod val="75000"/>
+                    </a:schemeClr>
+                  </a:solidFill>
+                </a:rPr>
+                <a:t>XmlAdaptedTag</a:t>
+              </a:r>
+              <a:endParaRPr lang="en-SG" sz="1050" b="1" dirty="0">
+                <a:solidFill>
+                  <a:schemeClr val="accent6">
+                    <a:lumMod val="75000"/>
+                  </a:schemeClr>
+                </a:solidFill>
+              </a:endParaRPr>
+            </a:p>
+          </p:txBody>
+        </p:sp>
+        <p:sp>
+          <p:nvSpPr>
+            <p:cNvPr id="74" name="Rectangle 8"/>
+            <p:cNvSpPr/>
+            <p:nvPr/>
+          </p:nvSpPr>
+          <p:spPr>
+            <a:xfrm>
+              <a:off x="7029273" y="2978242"/>
+              <a:ext cx="1259718" cy="346760"/>
+            </a:xfrm>
+            <a:prstGeom prst="rect">
+              <a:avLst/>
+            </a:prstGeom>
+            <a:ln w="19050"/>
+            <a:effectLst/>
+          </p:spPr>
+          <p:style>
+            <a:lnRef idx="1">
+              <a:schemeClr val="accent6"/>
+            </a:lnRef>
+            <a:fillRef idx="2">
+              <a:schemeClr val="accent6"/>
+            </a:fillRef>
+            <a:effectRef idx="1">
+              <a:schemeClr val="accent6"/>
+            </a:effectRef>
+            <a:fontRef idx="minor">
+              <a:schemeClr val="dk1"/>
+            </a:fontRef>
+          </p:style>
+          <p:txBody>
+            <a:bodyPr rtlCol="0" anchor="ctr"/>
+            <a:lstStyle/>
+            <a:p>
+              <a:pPr algn="ctr"/>
+              <a:r>
+                <a:rPr lang="en-US" sz="1050" b="1" dirty="0" err="1">
+                  <a:solidFill>
+                    <a:schemeClr val="accent6">
+                      <a:lumMod val="75000"/>
+                    </a:schemeClr>
+                  </a:solidFill>
+                </a:rPr>
+                <a:t>XmlAdaptedGuest</a:t>
+              </a:r>
+              <a:endParaRPr lang="en-SG" sz="1050" b="1" dirty="0">
+                <a:solidFill>
+                  <a:schemeClr val="accent6">
+                    <a:lumMod val="75000"/>
+                  </a:schemeClr>
+                </a:solidFill>
+              </a:endParaRPr>
+            </a:p>
+          </p:txBody>
+        </p:sp>
+        <p:cxnSp>
+          <p:nvCxnSpPr>
+            <p:cNvPr id="77" name="Elbow Connector 122"/>
+            <p:cNvCxnSpPr>
+              <a:stCxn id="66" idx="3"/>
+              <a:endCxn id="74" idx="1"/>
+            </p:cNvCxnSpPr>
+            <p:nvPr/>
+          </p:nvCxnSpPr>
+          <p:spPr>
+            <a:xfrm flipV="1">
+              <a:off x="6634042" y="3151622"/>
+              <a:ext cx="395231" cy="786"/>
+            </a:xfrm>
+            <a:prstGeom prst="bentConnector3">
+              <a:avLst>
+                <a:gd name="adj1" fmla="val 50000"/>
+              </a:avLst>
+            </a:prstGeom>
+            <a:ln w="19050">
+              <a:prstDash val="sysDot"/>
+              <a:headEnd type="none" w="med" len="med"/>
+              <a:tailEnd type="arrow" w="med" len="med"/>
+            </a:ln>
+            <a:effectLst/>
+          </p:spPr>
+          <p:style>
+            <a:lnRef idx="1">
+              <a:schemeClr val="accent6"/>
+            </a:lnRef>
+            <a:fillRef idx="2">
+              <a:schemeClr val="accent6"/>
+            </a:fillRef>
+            <a:effectRef idx="1">
+              <a:schemeClr val="accent6"/>
+            </a:effectRef>
+            <a:fontRef idx="minor">
+              <a:schemeClr val="dk1"/>
+            </a:fontRef>
+          </p:style>
+        </p:cxnSp>
+        <p:sp>
+          <p:nvSpPr>
+            <p:cNvPr id="26" name="Rectangle 8">
+              <a:extLst>
+                <a:ext uri="{FF2B5EF4-FFF2-40B4-BE49-F238E27FC236}">
+                  <a16:creationId xmlns:a16="http://schemas.microsoft.com/office/drawing/2014/main" id="{CAFA48EB-91F8-4FD5-A8AC-D29785669ECB}"/>
+                </a:ext>
+              </a:extLst>
+            </p:cNvPr>
+            <p:cNvSpPr/>
+            <p:nvPr/>
+          </p:nvSpPr>
+          <p:spPr>
+            <a:xfrm>
+              <a:off x="5403829" y="3682014"/>
+              <a:ext cx="1259718" cy="346760"/>
+            </a:xfrm>
+            <a:prstGeom prst="rect">
+              <a:avLst/>
+            </a:prstGeom>
+            <a:ln w="19050"/>
+            <a:effectLst/>
+          </p:spPr>
+          <p:style>
+            <a:lnRef idx="1">
+              <a:schemeClr val="accent6"/>
+            </a:lnRef>
+            <a:fillRef idx="2">
+              <a:schemeClr val="accent6"/>
+            </a:fillRef>
+            <a:effectRef idx="1">
+              <a:schemeClr val="accent6"/>
+            </a:effectRef>
+            <a:fontRef idx="minor">
+              <a:schemeClr val="dk1"/>
+            </a:fontRef>
+          </p:style>
+          <p:txBody>
+            <a:bodyPr rtlCol="0" anchor="ctr"/>
+            <a:lstStyle/>
+            <a:p>
+              <a:pPr algn="ctr"/>
+              <a:r>
+                <a:rPr lang="en-US" sz="1050" b="1" dirty="0" err="1">
+                  <a:solidFill>
+                    <a:schemeClr val="accent6">
+                      <a:lumMod val="75000"/>
+                    </a:schemeClr>
+                  </a:solidFill>
+                </a:rPr>
+                <a:t>XmlAdaptedRoom</a:t>
+              </a:r>
+              <a:endParaRPr lang="en-SG" sz="1050" b="1" dirty="0">
+                <a:solidFill>
+                  <a:schemeClr val="accent6">
+                    <a:lumMod val="75000"/>
+                  </a:schemeClr>
+                </a:solidFill>
+              </a:endParaRPr>
+            </a:p>
+          </p:txBody>
+        </p:sp>
+        <p:cxnSp>
+          <p:nvCxnSpPr>
+            <p:cNvPr id="27" name="Elbow Connector 122">
+              <a:extLst>
+                <a:ext uri="{FF2B5EF4-FFF2-40B4-BE49-F238E27FC236}">
+                  <a16:creationId xmlns:a16="http://schemas.microsoft.com/office/drawing/2014/main" id="{31467CE8-4240-4A73-8506-F920E657234C}"/>
+                </a:ext>
+              </a:extLst>
+            </p:cNvPr>
+            <p:cNvCxnSpPr>
+              <a:cxnSpLocks/>
+              <a:stCxn id="66" idx="2"/>
+              <a:endCxn id="26" idx="0"/>
+            </p:cNvCxnSpPr>
+            <p:nvPr/>
+          </p:nvCxnSpPr>
+          <p:spPr>
+            <a:xfrm rot="5400000">
+              <a:off x="5855576" y="3503901"/>
+              <a:ext cx="356226" cy="1"/>
+            </a:xfrm>
+            <a:prstGeom prst="bentConnector3">
+              <a:avLst>
+                <a:gd name="adj1" fmla="val 50000"/>
+              </a:avLst>
+            </a:prstGeom>
+            <a:ln w="19050">
+              <a:prstDash val="sysDot"/>
+              <a:headEnd type="none" w="med" len="med"/>
+              <a:tailEnd type="arrow" w="med" len="med"/>
+            </a:ln>
+            <a:effectLst/>
+          </p:spPr>
+          <p:style>
+            <a:lnRef idx="1">
+              <a:schemeClr val="accent6"/>
+            </a:lnRef>
+            <a:fillRef idx="2">
+              <a:schemeClr val="accent6"/>
+            </a:fillRef>
+            <a:effectRef idx="1">
+              <a:schemeClr val="accent6"/>
+            </a:effectRef>
+            <a:fontRef idx="minor">
+              <a:schemeClr val="dk1"/>
+            </a:fontRef>
+          </p:style>
+        </p:cxnSp>
+        <p:sp>
+          <p:nvSpPr>
+            <p:cNvPr id="34" name="Rectangle 8">
+              <a:extLst>
+                <a:ext uri="{FF2B5EF4-FFF2-40B4-BE49-F238E27FC236}">
+                  <a16:creationId xmlns:a16="http://schemas.microsoft.com/office/drawing/2014/main" id="{71E06130-AA66-421E-B20F-9C14FA25AFF5}"/>
+                </a:ext>
+              </a:extLst>
+            </p:cNvPr>
+            <p:cNvSpPr/>
+            <p:nvPr/>
+          </p:nvSpPr>
+          <p:spPr>
+            <a:xfrm>
+              <a:off x="5409884" y="4340879"/>
+              <a:ext cx="1253663" cy="346760"/>
+            </a:xfrm>
+            <a:prstGeom prst="rect">
+              <a:avLst/>
+            </a:prstGeom>
+            <a:ln w="19050"/>
+            <a:effectLst/>
+          </p:spPr>
+          <p:style>
+            <a:lnRef idx="1">
+              <a:schemeClr val="accent6"/>
+            </a:lnRef>
+            <a:fillRef idx="2">
+              <a:schemeClr val="accent6"/>
+            </a:fillRef>
+            <a:effectRef idx="1">
+              <a:schemeClr val="accent6"/>
+            </a:effectRef>
+            <a:fontRef idx="minor">
+              <a:schemeClr val="dk1"/>
+            </a:fontRef>
+          </p:style>
+          <p:txBody>
+            <a:bodyPr rtlCol="0" anchor="ctr"/>
+            <a:lstStyle/>
+            <a:p>
+              <a:pPr algn="ctr"/>
+              <a:r>
+                <a:rPr lang="en-US" sz="1050" b="1" dirty="0" err="1">
+                  <a:solidFill>
+                    <a:schemeClr val="accent6">
+                      <a:lumMod val="75000"/>
+                    </a:schemeClr>
+                  </a:solidFill>
+                </a:rPr>
+                <a:t>XmlAdapted</a:t>
+              </a:r>
+              <a:endParaRPr lang="en-US" sz="1050" b="1" dirty="0">
+                <a:solidFill>
+                  <a:schemeClr val="accent6">
+                    <a:lumMod val="75000"/>
+                  </a:schemeClr>
+                </a:solidFill>
+              </a:endParaRPr>
+            </a:p>
+            <a:p>
+              <a:pPr algn="ctr"/>
+              <a:r>
+                <a:rPr lang="en-US" sz="1050" b="1" dirty="0">
+                  <a:solidFill>
+                    <a:schemeClr val="accent6">
+                      <a:lumMod val="75000"/>
+                    </a:schemeClr>
+                  </a:solidFill>
+                </a:rPr>
+                <a:t>Booking</a:t>
+              </a:r>
+              <a:endParaRPr lang="en-SG" sz="1050" b="1" dirty="0">
+                <a:solidFill>
+                  <a:schemeClr val="accent6">
+                    <a:lumMod val="75000"/>
+                  </a:schemeClr>
+                </a:solidFill>
+              </a:endParaRPr>
+            </a:p>
+          </p:txBody>
+        </p:sp>
+        <p:cxnSp>
+          <p:nvCxnSpPr>
+            <p:cNvPr id="35" name="Elbow Connector 122">
+              <a:extLst>
+                <a:ext uri="{FF2B5EF4-FFF2-40B4-BE49-F238E27FC236}">
+                  <a16:creationId xmlns:a16="http://schemas.microsoft.com/office/drawing/2014/main" id="{D92A3796-A76B-403B-B5E6-F37C2C835914}"/>
+                </a:ext>
+              </a:extLst>
+            </p:cNvPr>
+            <p:cNvCxnSpPr>
+              <a:cxnSpLocks/>
+              <a:stCxn id="26" idx="2"/>
+              <a:endCxn id="34" idx="0"/>
+            </p:cNvCxnSpPr>
+            <p:nvPr/>
+          </p:nvCxnSpPr>
+          <p:spPr>
+            <a:xfrm rot="16200000" flipH="1">
+              <a:off x="5879150" y="4183312"/>
+              <a:ext cx="312105" cy="3028"/>
+            </a:xfrm>
+            <a:prstGeom prst="bentConnector3">
+              <a:avLst>
+                <a:gd name="adj1" fmla="val 50000"/>
+              </a:avLst>
+            </a:prstGeom>
+            <a:ln w="19050">
+              <a:prstDash val="sysDot"/>
+              <a:headEnd type="none" w="med" len="med"/>
+              <a:tailEnd type="arrow" w="med" len="med"/>
+            </a:ln>
+            <a:effectLst/>
+          </p:spPr>
+          <p:style>
+            <a:lnRef idx="1">
+              <a:schemeClr val="accent6"/>
+            </a:lnRef>
+            <a:fillRef idx="2">
+              <a:schemeClr val="accent6"/>
+            </a:fillRef>
+            <a:effectRef idx="1">
+              <a:schemeClr val="accent6"/>
+            </a:effectRef>
+            <a:fontRef idx="minor">
+              <a:schemeClr val="dk1"/>
+            </a:fontRef>
+          </p:style>
+        </p:cxnSp>
+        <p:sp>
+          <p:nvSpPr>
+            <p:cNvPr id="38" name="Rectangle 8">
+              <a:extLst>
+                <a:ext uri="{FF2B5EF4-FFF2-40B4-BE49-F238E27FC236}">
+                  <a16:creationId xmlns:a16="http://schemas.microsoft.com/office/drawing/2014/main" id="{035104FD-5FDD-43D3-955A-42825FE15734}"/>
+                </a:ext>
+              </a:extLst>
+            </p:cNvPr>
+            <p:cNvSpPr/>
+            <p:nvPr/>
+          </p:nvSpPr>
+          <p:spPr>
+            <a:xfrm>
+              <a:off x="4031663" y="3682572"/>
+              <a:ext cx="1173072" cy="346760"/>
+            </a:xfrm>
+            <a:prstGeom prst="rect">
+              <a:avLst/>
+            </a:prstGeom>
+            <a:ln w="19050"/>
+            <a:effectLst/>
+          </p:spPr>
+          <p:style>
+            <a:lnRef idx="1">
+              <a:schemeClr val="accent6"/>
+            </a:lnRef>
+            <a:fillRef idx="2">
+              <a:schemeClr val="accent6"/>
+            </a:fillRef>
+            <a:effectRef idx="1">
+              <a:schemeClr val="accent6"/>
+            </a:effectRef>
+            <a:fontRef idx="minor">
+              <a:schemeClr val="dk1"/>
+            </a:fontRef>
+          </p:style>
+          <p:txBody>
+            <a:bodyPr rtlCol="0" anchor="ctr"/>
+            <a:lstStyle/>
+            <a:p>
+              <a:pPr algn="ctr"/>
+              <a:r>
+                <a:rPr lang="en-US" sz="1050" b="1" dirty="0" err="1">
+                  <a:solidFill>
+                    <a:schemeClr val="accent6">
+                      <a:lumMod val="75000"/>
+                    </a:schemeClr>
+                  </a:solidFill>
+                </a:rPr>
+                <a:t>XmlAdapted</a:t>
+              </a:r>
+              <a:endParaRPr lang="en-US" sz="1050" b="1" dirty="0">
+                <a:solidFill>
+                  <a:schemeClr val="accent6">
+                    <a:lumMod val="75000"/>
+                  </a:schemeClr>
+                </a:solidFill>
+              </a:endParaRPr>
+            </a:p>
+            <a:p>
+              <a:pPr algn="ctr"/>
+              <a:r>
+                <a:rPr lang="en-US" sz="1050" b="1" dirty="0">
+                  <a:solidFill>
+                    <a:schemeClr val="accent6">
+                      <a:lumMod val="75000"/>
+                    </a:schemeClr>
+                  </a:solidFill>
+                </a:rPr>
+                <a:t>Expense</a:t>
+              </a:r>
+              <a:endParaRPr lang="en-SG" sz="1050" b="1" dirty="0">
+                <a:solidFill>
+                  <a:schemeClr val="accent6">
+                    <a:lumMod val="75000"/>
+                  </a:schemeClr>
+                </a:solidFill>
+              </a:endParaRPr>
+            </a:p>
+          </p:txBody>
+        </p:sp>
+        <p:cxnSp>
+          <p:nvCxnSpPr>
+            <p:cNvPr id="39" name="Elbow Connector 122">
+              <a:extLst>
+                <a:ext uri="{FF2B5EF4-FFF2-40B4-BE49-F238E27FC236}">
+                  <a16:creationId xmlns:a16="http://schemas.microsoft.com/office/drawing/2014/main" id="{BEA2A0B7-7FE9-4D80-9865-91CDA9E2984D}"/>
+                </a:ext>
+              </a:extLst>
+            </p:cNvPr>
+            <p:cNvCxnSpPr>
+              <a:cxnSpLocks/>
+              <a:stCxn id="26" idx="1"/>
+              <a:endCxn id="38" idx="3"/>
+            </p:cNvCxnSpPr>
+            <p:nvPr/>
+          </p:nvCxnSpPr>
+          <p:spPr>
+            <a:xfrm rot="10800000" flipV="1">
+              <a:off x="5204735" y="3855394"/>
+              <a:ext cx="199094" cy="558"/>
+            </a:xfrm>
+            <a:prstGeom prst="bentConnector3">
+              <a:avLst>
+                <a:gd name="adj1" fmla="val 50000"/>
+              </a:avLst>
+            </a:prstGeom>
+            <a:ln w="19050">
+              <a:prstDash val="sysDot"/>
+              <a:headEnd type="none" w="med" len="med"/>
+              <a:tailEnd type="arrow" w="med" len="med"/>
+            </a:ln>
+            <a:effectLst/>
+          </p:spPr>
+          <p:style>
+            <a:lnRef idx="1">
+              <a:schemeClr val="accent6"/>
+            </a:lnRef>
+            <a:fillRef idx="2">
+              <a:schemeClr val="accent6"/>
+            </a:fillRef>
+            <a:effectRef idx="1">
+              <a:schemeClr val="accent6"/>
+            </a:effectRef>
+            <a:fontRef idx="minor">
+              <a:schemeClr val="dk1"/>
+            </a:fontRef>
+          </p:style>
+        </p:cxnSp>
+        <p:cxnSp>
+          <p:nvCxnSpPr>
+            <p:cNvPr id="51" name="Elbow Connector 122">
+              <a:extLst>
+                <a:ext uri="{FF2B5EF4-FFF2-40B4-BE49-F238E27FC236}">
+                  <a16:creationId xmlns:a16="http://schemas.microsoft.com/office/drawing/2014/main" id="{C91A05C6-E28A-4AAF-AD13-7EA657AAAA52}"/>
+                </a:ext>
+              </a:extLst>
+            </p:cNvPr>
+            <p:cNvCxnSpPr>
+              <a:cxnSpLocks/>
+              <a:stCxn id="26" idx="3"/>
+              <a:endCxn id="73" idx="1"/>
+            </p:cNvCxnSpPr>
+            <p:nvPr/>
+          </p:nvCxnSpPr>
+          <p:spPr>
+            <a:xfrm flipV="1">
+              <a:off x="6663547" y="3855392"/>
+              <a:ext cx="365718" cy="2"/>
+            </a:xfrm>
+            <a:prstGeom prst="bentConnector3">
+              <a:avLst>
+                <a:gd name="adj1" fmla="val 50000"/>
+              </a:avLst>
+            </a:prstGeom>
+            <a:ln w="19050">
+              <a:prstDash val="sysDot"/>
+              <a:headEnd type="none" w="med" len="med"/>
+              <a:tailEnd type="arrow" w="med" len="med"/>
+            </a:ln>
+            <a:effectLst/>
+          </p:spPr>
+          <p:style>
+            <a:lnRef idx="1">
+              <a:schemeClr val="accent6"/>
+            </a:lnRef>
+            <a:fillRef idx="2">
+              <a:schemeClr val="accent6"/>
+            </a:fillRef>
+            <a:effectRef idx="1">
+              <a:schemeClr val="accent6"/>
+            </a:effectRef>
+            <a:fontRef idx="minor">
+              <a:schemeClr val="dk1"/>
+            </a:fontRef>
+          </p:style>
+        </p:cxnSp>
+        <p:sp>
+          <p:nvSpPr>
+            <p:cNvPr id="57" name="Rectangle 8">
+              <a:extLst>
+                <a:ext uri="{FF2B5EF4-FFF2-40B4-BE49-F238E27FC236}">
+                  <a16:creationId xmlns:a16="http://schemas.microsoft.com/office/drawing/2014/main" id="{A4C6C936-AB77-4718-A680-42F85952FF42}"/>
+                </a:ext>
+              </a:extLst>
+            </p:cNvPr>
+            <p:cNvSpPr/>
+            <p:nvPr/>
+          </p:nvSpPr>
+          <p:spPr>
+            <a:xfrm>
+              <a:off x="5435515" y="2367458"/>
+              <a:ext cx="1198527" cy="346760"/>
+            </a:xfrm>
+            <a:prstGeom prst="rect">
+              <a:avLst/>
+            </a:prstGeom>
+            <a:ln w="19050"/>
+            <a:effectLst/>
+          </p:spPr>
+          <p:style>
+            <a:lnRef idx="1">
+              <a:schemeClr val="accent6"/>
+            </a:lnRef>
+            <a:fillRef idx="2">
+              <a:schemeClr val="accent6"/>
+            </a:fillRef>
+            <a:effectRef idx="1">
+              <a:schemeClr val="accent6"/>
+            </a:effectRef>
+            <a:fontRef idx="minor">
+              <a:schemeClr val="dk1"/>
+            </a:fontRef>
+          </p:style>
+          <p:txBody>
+            <a:bodyPr rtlCol="0" anchor="ctr"/>
+            <a:lstStyle/>
+            <a:p>
+              <a:pPr algn="ctr"/>
+              <a:r>
+                <a:rPr lang="en-US" sz="1050" b="1" dirty="0" err="1">
+                  <a:solidFill>
+                    <a:schemeClr val="accent6">
+                      <a:lumMod val="75000"/>
+                    </a:schemeClr>
+                  </a:solidFill>
+                </a:rPr>
+                <a:t>XmlAdapted</a:t>
+              </a:r>
+              <a:endParaRPr lang="en-US" sz="1050" b="1" dirty="0">
+                <a:solidFill>
+                  <a:schemeClr val="accent6">
+                    <a:lumMod val="75000"/>
+                  </a:schemeClr>
+                </a:solidFill>
+              </a:endParaRPr>
+            </a:p>
+            <a:p>
+              <a:pPr algn="ctr"/>
+              <a:r>
+                <a:rPr lang="en-US" sz="1050" b="1" dirty="0" err="1">
+                  <a:solidFill>
+                    <a:schemeClr val="accent6">
+                      <a:lumMod val="75000"/>
+                    </a:schemeClr>
+                  </a:solidFill>
+                </a:rPr>
+                <a:t>ExpenseType</a:t>
+              </a:r>
+              <a:endParaRPr lang="en-SG" sz="1050" b="1" dirty="0">
+                <a:solidFill>
+                  <a:schemeClr val="accent6">
+                    <a:lumMod val="75000"/>
+                  </a:schemeClr>
+                </a:solidFill>
+              </a:endParaRPr>
+            </a:p>
+          </p:txBody>
+        </p:sp>
+        <p:cxnSp>
+          <p:nvCxnSpPr>
+            <p:cNvPr id="59" name="Elbow Connector 122">
+              <a:extLst>
+                <a:ext uri="{FF2B5EF4-FFF2-40B4-BE49-F238E27FC236}">
+                  <a16:creationId xmlns:a16="http://schemas.microsoft.com/office/drawing/2014/main" id="{5B7B5573-5358-48EE-A1C6-2B96B3705651}"/>
+                </a:ext>
+              </a:extLst>
+            </p:cNvPr>
+            <p:cNvCxnSpPr>
+              <a:cxnSpLocks/>
+              <a:stCxn id="66" idx="0"/>
+              <a:endCxn id="57" idx="2"/>
+            </p:cNvCxnSpPr>
+            <p:nvPr/>
+          </p:nvCxnSpPr>
+          <p:spPr>
+            <a:xfrm rot="5400000" flipH="1" flipV="1">
+              <a:off x="5901829" y="2846078"/>
+              <a:ext cx="264810" cy="1090"/>
+            </a:xfrm>
+            <a:prstGeom prst="bentConnector3">
+              <a:avLst>
+                <a:gd name="adj1" fmla="val 50000"/>
+              </a:avLst>
+            </a:prstGeom>
+            <a:ln w="19050">
+              <a:prstDash val="sysDot"/>
+              <a:headEnd type="none" w="med" len="med"/>
+              <a:tailEnd type="arrow" w="med" len="med"/>
+            </a:ln>
+            <a:effectLst/>
+          </p:spPr>
+          <p:style>
+            <a:lnRef idx="1">
+              <a:schemeClr val="accent6"/>
+            </a:lnRef>
+            <a:fillRef idx="2">
+              <a:schemeClr val="accent6"/>
+            </a:fillRef>
+            <a:effectRef idx="1">
+              <a:schemeClr val="accent6"/>
+            </a:effectRef>
+            <a:fontRef idx="minor">
+              <a:schemeClr val="dk1"/>
+            </a:fontRef>
+          </p:style>
+        </p:cxnSp>
+        <p:cxnSp>
+          <p:nvCxnSpPr>
+            <p:cNvPr id="67" name="Elbow Connector 122">
+              <a:extLst>
+                <a:ext uri="{FF2B5EF4-FFF2-40B4-BE49-F238E27FC236}">
+                  <a16:creationId xmlns:a16="http://schemas.microsoft.com/office/drawing/2014/main" id="{35194C30-B723-4296-A74E-5C623F2CD025}"/>
+                </a:ext>
+              </a:extLst>
+            </p:cNvPr>
+            <p:cNvCxnSpPr>
+              <a:cxnSpLocks/>
+              <a:stCxn id="34" idx="3"/>
+              <a:endCxn id="74" idx="3"/>
+            </p:cNvCxnSpPr>
+            <p:nvPr/>
+          </p:nvCxnSpPr>
+          <p:spPr>
+            <a:xfrm flipV="1">
+              <a:off x="6663547" y="3151622"/>
+              <a:ext cx="1625444" cy="1362637"/>
+            </a:xfrm>
+            <a:prstGeom prst="bentConnector3">
+              <a:avLst>
+                <a:gd name="adj1" fmla="val 114064"/>
+              </a:avLst>
+            </a:prstGeom>
+            <a:ln w="19050">
+              <a:prstDash val="sysDot"/>
+              <a:headEnd type="none" w="med" len="med"/>
+              <a:tailEnd type="arrow" w="med" len="med"/>
+            </a:ln>
+            <a:effectLst/>
+          </p:spPr>
+          <p:style>
+            <a:lnRef idx="1">
+              <a:schemeClr val="accent6"/>
+            </a:lnRef>
+            <a:fillRef idx="2">
+              <a:schemeClr val="accent6"/>
+            </a:fillRef>
+            <a:effectRef idx="1">
+              <a:schemeClr val="accent6"/>
+            </a:effectRef>
+            <a:fontRef idx="minor">
+              <a:schemeClr val="dk1"/>
+            </a:fontRef>
+          </p:style>
+        </p:cxnSp>
+        <p:sp>
+          <p:nvSpPr>
+            <p:cNvPr id="72" name="Rectangle 8">
+              <a:extLst>
+                <a:ext uri="{FF2B5EF4-FFF2-40B4-BE49-F238E27FC236}">
+                  <a16:creationId xmlns:a16="http://schemas.microsoft.com/office/drawing/2014/main" id="{38166CC0-444D-4448-AC49-BAD0F743FC06}"/>
+                </a:ext>
+              </a:extLst>
+            </p:cNvPr>
+            <p:cNvSpPr/>
+            <p:nvPr/>
+          </p:nvSpPr>
+          <p:spPr>
+            <a:xfrm>
+              <a:off x="5414246" y="4964668"/>
+              <a:ext cx="1253663" cy="346760"/>
+            </a:xfrm>
+            <a:prstGeom prst="rect">
+              <a:avLst/>
+            </a:prstGeom>
+            <a:ln w="19050"/>
+            <a:effectLst/>
+          </p:spPr>
+          <p:style>
+            <a:lnRef idx="1">
+              <a:schemeClr val="accent6"/>
+            </a:lnRef>
+            <a:fillRef idx="2">
+              <a:schemeClr val="accent6"/>
+            </a:fillRef>
+            <a:effectRef idx="1">
+              <a:schemeClr val="accent6"/>
+            </a:effectRef>
+            <a:fontRef idx="minor">
+              <a:schemeClr val="dk1"/>
+            </a:fontRef>
+          </p:style>
+          <p:txBody>
+            <a:bodyPr rtlCol="0" anchor="ctr"/>
+            <a:lstStyle/>
+            <a:p>
+              <a:pPr algn="ctr"/>
+              <a:r>
+                <a:rPr lang="en-US" sz="1050" b="1" dirty="0" err="1">
+                  <a:solidFill>
+                    <a:schemeClr val="accent6">
+                      <a:lumMod val="75000"/>
+                    </a:schemeClr>
+                  </a:solidFill>
+                </a:rPr>
+                <a:t>XmlAdapted</a:t>
+              </a:r>
+              <a:endParaRPr lang="en-US" sz="1050" b="1" dirty="0">
+                <a:solidFill>
+                  <a:schemeClr val="accent6">
+                    <a:lumMod val="75000"/>
+                  </a:schemeClr>
+                </a:solidFill>
+              </a:endParaRPr>
+            </a:p>
+            <a:p>
+              <a:pPr algn="ctr"/>
+              <a:r>
+                <a:rPr lang="en-US" sz="1050" b="1" dirty="0" err="1">
+                  <a:solidFill>
+                    <a:schemeClr val="accent6">
+                      <a:lumMod val="75000"/>
+                    </a:schemeClr>
+                  </a:solidFill>
+                </a:rPr>
+                <a:t>BookingPeriod</a:t>
+              </a:r>
+              <a:endParaRPr lang="en-SG" sz="1050" b="1" dirty="0">
+                <a:solidFill>
+                  <a:schemeClr val="accent6">
+                    <a:lumMod val="75000"/>
+                  </a:schemeClr>
+                </a:solidFill>
+              </a:endParaRPr>
+            </a:p>
+          </p:txBody>
+        </p:sp>
+        <p:cxnSp>
+          <p:nvCxnSpPr>
+            <p:cNvPr id="76" name="Elbow Connector 122">
+              <a:extLst>
+                <a:ext uri="{FF2B5EF4-FFF2-40B4-BE49-F238E27FC236}">
+                  <a16:creationId xmlns:a16="http://schemas.microsoft.com/office/drawing/2014/main" id="{2585F7A8-FD0D-4B0A-BFC4-AB7C75F3D8C5}"/>
+                </a:ext>
+              </a:extLst>
+            </p:cNvPr>
+            <p:cNvCxnSpPr>
+              <a:cxnSpLocks/>
+              <a:stCxn id="34" idx="2"/>
+              <a:endCxn id="72" idx="0"/>
+            </p:cNvCxnSpPr>
+            <p:nvPr/>
+          </p:nvCxnSpPr>
+          <p:spPr>
+            <a:xfrm rot="16200000" flipH="1">
+              <a:off x="5900383" y="4823972"/>
+              <a:ext cx="277029" cy="4362"/>
+            </a:xfrm>
+            <a:prstGeom prst="bentConnector3">
+              <a:avLst>
+                <a:gd name="adj1" fmla="val 50000"/>
+              </a:avLst>
+            </a:prstGeom>
+            <a:ln w="19050">
+              <a:prstDash val="sysDot"/>
+              <a:headEnd type="none" w="med" len="med"/>
+              <a:tailEnd type="arrow" w="med" len="med"/>
+            </a:ln>
+            <a:effectLst/>
+          </p:spPr>
+          <p:style>
+            <a:lnRef idx="1">
+              <a:schemeClr val="accent6"/>
+            </a:lnRef>
+            <a:fillRef idx="2">
+              <a:schemeClr val="accent6"/>
+            </a:fillRef>
+            <a:effectRef idx="1">
+              <a:schemeClr val="accent6"/>
+            </a:effectRef>
+            <a:fontRef idx="minor">
+              <a:schemeClr val="dk1"/>
+            </a:fontRef>
+          </p:style>
+        </p:cxnSp>
+      </p:grpSp>
+      <p:sp>
+        <p:nvSpPr>
+          <p:cNvPr id="81" name="Rectangle 8">
+            <a:extLst>
+              <a:ext uri="{FF2B5EF4-FFF2-40B4-BE49-F238E27FC236}">
+                <a16:creationId xmlns:a16="http://schemas.microsoft.com/office/drawing/2014/main" id="{3838ACF0-4768-4FAA-B61E-B2DE88732EEF}"/>
+              </a:ext>
+            </a:extLst>
+          </p:cNvPr>
           <p:cNvSpPr/>
           <p:nvPr/>
         </p:nvSpPr>
         <p:spPr>
           <a:xfrm>
-            <a:off x="2420322" y="3239846"/>
+            <a:off x="2274555" y="4033915"/>
+            <a:ext cx="1323049" cy="346760"/>
+          </a:xfrm>
+          <a:prstGeom prst="rect">
+            <a:avLst/>
+          </a:prstGeom>
+          <a:solidFill>
+            <a:schemeClr val="accent6">
+              <a:lumMod val="75000"/>
+            </a:schemeClr>
+          </a:solidFill>
+          <a:ln w="19050">
+            <a:solidFill>
+              <a:schemeClr val="accent6">
+                <a:lumMod val="75000"/>
+              </a:schemeClr>
+            </a:solidFill>
+          </a:ln>
+          <a:effectLst/>
+        </p:spPr>
+        <p:style>
+          <a:lnRef idx="1">
+            <a:schemeClr val="accent2"/>
+          </a:lnRef>
+          <a:fillRef idx="2">
+            <a:schemeClr val="accent2"/>
+          </a:fillRef>
+          <a:effectRef idx="1">
+            <a:schemeClr val="accent2"/>
+          </a:effectRef>
+          <a:fontRef idx="minor">
+            <a:schemeClr val="dk1"/>
+          </a:fontRef>
+        </p:style>
+        <p:txBody>
+          <a:bodyPr rtlCol="0" anchor="ctr"/>
+          <a:lstStyle/>
+          <a:p>
+            <a:pPr algn="ctr"/>
+            <a:r>
+              <a:rPr lang="en-US" sz="1050" dirty="0">
+                <a:solidFill>
+                  <a:schemeClr val="bg1"/>
+                </a:solidFill>
+              </a:rPr>
+              <a:t>&lt;&lt;interface&gt;&gt;</a:t>
+            </a:r>
+            <a:br>
+              <a:rPr lang="en-US" sz="1050" dirty="0">
+                <a:solidFill>
+                  <a:schemeClr val="bg1"/>
+                </a:solidFill>
+              </a:rPr>
+            </a:br>
+            <a:r>
+              <a:rPr lang="en-US" sz="1050" dirty="0" err="1">
+                <a:solidFill>
+                  <a:schemeClr val="bg1"/>
+                </a:solidFill>
+              </a:rPr>
+              <a:t>UserPrefsStorage</a:t>
+            </a:r>
+            <a:endParaRPr lang="en-SG" sz="1050" dirty="0">
+              <a:solidFill>
+                <a:schemeClr val="bg1"/>
+              </a:solidFill>
+            </a:endParaRPr>
+          </a:p>
+        </p:txBody>
+      </p:sp>
+      <p:cxnSp>
+        <p:nvCxnSpPr>
+          <p:cNvPr id="82" name="Straight Arrow Connector 81">
+            <a:extLst>
+              <a:ext uri="{FF2B5EF4-FFF2-40B4-BE49-F238E27FC236}">
+                <a16:creationId xmlns:a16="http://schemas.microsoft.com/office/drawing/2014/main" id="{64EEE206-E9D5-407B-BBC0-8D5364D740A9}"/>
+              </a:ext>
+            </a:extLst>
+          </p:cNvPr>
+          <p:cNvCxnSpPr>
+            <a:stCxn id="83" idx="3"/>
+            <a:endCxn id="81" idx="1"/>
+          </p:cNvCxnSpPr>
+          <p:nvPr/>
+        </p:nvCxnSpPr>
+        <p:spPr>
+          <a:xfrm>
+            <a:off x="2053745" y="4202011"/>
+            <a:ext cx="220810" cy="5284"/>
+          </a:xfrm>
+          <a:prstGeom prst="straightConnector1">
+            <a:avLst/>
+          </a:prstGeom>
+          <a:ln w="19050">
+            <a:solidFill>
+              <a:schemeClr val="accent6">
+                <a:lumMod val="75000"/>
+              </a:schemeClr>
+            </a:solidFill>
+            <a:headEnd type="none" w="med" len="med"/>
+            <a:tailEnd type="arrow" w="med" len="med"/>
+          </a:ln>
+          <a:effectLst/>
+        </p:spPr>
+        <p:style>
+          <a:lnRef idx="1">
+            <a:schemeClr val="accent2"/>
+          </a:lnRef>
+          <a:fillRef idx="2">
+            <a:schemeClr val="accent2"/>
+          </a:fillRef>
+          <a:effectRef idx="1">
+            <a:schemeClr val="accent2"/>
+          </a:effectRef>
+          <a:fontRef idx="minor">
+            <a:schemeClr val="dk1"/>
+          </a:fontRef>
+        </p:style>
+      </p:cxnSp>
+      <p:sp>
+        <p:nvSpPr>
+          <p:cNvPr id="83" name="Flowchart: Decision 96">
+            <a:extLst>
+              <a:ext uri="{FF2B5EF4-FFF2-40B4-BE49-F238E27FC236}">
+                <a16:creationId xmlns:a16="http://schemas.microsoft.com/office/drawing/2014/main" id="{B3389424-72A2-45C8-A84E-D147EF5942DC}"/>
+              </a:ext>
+            </a:extLst>
+          </p:cNvPr>
+          <p:cNvSpPr/>
+          <p:nvPr/>
+        </p:nvSpPr>
+        <p:spPr>
+          <a:xfrm>
+            <a:off x="1817697" y="4115321"/>
             <a:ext cx="236048" cy="173380"/>
           </a:xfrm>
           <a:prstGeom prst="flowChartDecision">
@@ -3965,16 +5388,22 @@
       </p:sp>
       <p:cxnSp>
         <p:nvCxnSpPr>
-          <p:cNvPr id="97" name="Elbow Connector 63"/>
+          <p:cNvPr id="84" name="Elbow Connector 63">
+            <a:extLst>
+              <a:ext uri="{FF2B5EF4-FFF2-40B4-BE49-F238E27FC236}">
+                <a16:creationId xmlns:a16="http://schemas.microsoft.com/office/drawing/2014/main" id="{2CDD9A02-55CC-44B5-BFC4-FEFF251D547B}"/>
+              </a:ext>
+            </a:extLst>
+          </p:cNvPr>
           <p:cNvCxnSpPr>
-            <a:stCxn id="99" idx="3"/>
-            <a:endCxn id="50" idx="1"/>
+            <a:stCxn id="85" idx="3"/>
+            <a:endCxn id="86" idx="1"/>
           </p:cNvCxnSpPr>
           <p:nvPr/>
         </p:nvCxnSpPr>
         <p:spPr>
           <a:xfrm flipV="1">
-            <a:off x="4398041" y="3331820"/>
+            <a:off x="3795416" y="4207295"/>
             <a:ext cx="223324" cy="1"/>
           </a:xfrm>
           <a:prstGeom prst="bentConnector3">
@@ -4011,13 +5440,19 @@
       </p:cxnSp>
       <p:sp>
         <p:nvSpPr>
-          <p:cNvPr id="99" name="Isosceles Triangle 102"/>
+          <p:cNvPr id="85" name="Isosceles Triangle 102">
+            <a:extLst>
+              <a:ext uri="{FF2B5EF4-FFF2-40B4-BE49-F238E27FC236}">
+                <a16:creationId xmlns:a16="http://schemas.microsoft.com/office/drawing/2014/main" id="{B64C1ACF-9AF0-4A24-899E-3B35CC6BBACB}"/>
+              </a:ext>
+            </a:extLst>
+          </p:cNvPr>
           <p:cNvSpPr/>
           <p:nvPr/>
         </p:nvSpPr>
         <p:spPr>
           <a:xfrm rot="5400000" flipV="1">
-            <a:off x="4175027" y="3244059"/>
+            <a:off x="3572402" y="4119534"/>
             <a:ext cx="270504" cy="175523"/>
           </a:xfrm>
           <a:prstGeom prst="triangle">
@@ -4064,34 +5499,37 @@
           </a:p>
         </p:txBody>
       </p:sp>
-      <p:cxnSp>
-        <p:nvCxnSpPr>
-          <p:cNvPr id="124" name="Elbow Connector 122"/>
-          <p:cNvCxnSpPr>
-            <a:stCxn id="50" idx="3"/>
-            <a:endCxn id="66" idx="1"/>
-          </p:cNvCxnSpPr>
+      <p:sp>
+        <p:nvSpPr>
+          <p:cNvPr id="86" name="Rectangle 8">
+            <a:extLst>
+              <a:ext uri="{FF2B5EF4-FFF2-40B4-BE49-F238E27FC236}">
+                <a16:creationId xmlns:a16="http://schemas.microsoft.com/office/drawing/2014/main" id="{C4466C37-C406-40E7-90FC-3746D03B4FBA}"/>
+              </a:ext>
+            </a:extLst>
+          </p:cNvPr>
+          <p:cNvSpPr/>
           <p:nvPr/>
-        </p:nvCxnSpPr>
+        </p:nvSpPr>
         <p:spPr>
           <a:xfrm>
-            <a:off x="5791200" y="3331820"/>
-            <a:ext cx="228600" cy="1970"/>
+            <a:off x="4018740" y="4033915"/>
+            <a:ext cx="1093635" cy="346760"/>
           </a:xfrm>
-          <a:prstGeom prst="bentConnector3">
-            <a:avLst>
-              <a:gd name="adj1" fmla="val 50000"/>
-            </a:avLst>
+          <a:prstGeom prst="rect">
+            <a:avLst/>
           </a:prstGeom>
+          <a:solidFill>
+            <a:schemeClr val="accent6">
+              <a:lumMod val="75000"/>
+            </a:schemeClr>
+          </a:solidFill>
           <a:ln w="19050">
             <a:solidFill>
               <a:schemeClr val="accent6">
                 <a:lumMod val="75000"/>
               </a:schemeClr>
             </a:solidFill>
-            <a:prstDash val="sysDot"/>
-            <a:headEnd type="none" w="med" len="med"/>
-            <a:tailEnd type="arrow" w="med" len="med"/>
           </a:ln>
           <a:effectLst/>
         </p:spPr>
@@ -4109,87 +5547,37 @@
             <a:schemeClr val="dk1"/>
           </a:fontRef>
         </p:style>
-      </p:cxnSp>
-      <p:sp>
-        <p:nvSpPr>
-          <p:cNvPr id="50" name="Rectangle 8"/>
-          <p:cNvSpPr/>
-          <p:nvPr/>
-        </p:nvSpPr>
-        <p:spPr>
-          <a:xfrm>
-            <a:off x="4621365" y="3158440"/>
-            <a:ext cx="1169835" cy="346760"/>
-          </a:xfrm>
-          <a:prstGeom prst="rect">
-            <a:avLst/>
-          </a:prstGeom>
-          <a:ln w="19050"/>
-          <a:effectLst/>
-        </p:spPr>
-        <p:style>
-          <a:lnRef idx="1">
-            <a:schemeClr val="accent6"/>
-          </a:lnRef>
-          <a:fillRef idx="2">
-            <a:schemeClr val="accent6"/>
-          </a:fillRef>
-          <a:effectRef idx="1">
-            <a:schemeClr val="accent6"/>
-          </a:effectRef>
-          <a:fontRef idx="minor">
-            <a:schemeClr val="dk1"/>
-          </a:fontRef>
-        </p:style>
         <p:txBody>
           <a:bodyPr rtlCol="0" anchor="ctr"/>
           <a:lstStyle/>
           <a:p>
             <a:pPr algn="ctr"/>
             <a:r>
-              <a:rPr lang="en-US" sz="1050" b="1" dirty="0" err="1" smtClean="0">
+              <a:rPr lang="en-US" sz="1050" dirty="0" err="1">
                 <a:solidFill>
-                  <a:schemeClr val="accent6">
-                    <a:lumMod val="75000"/>
-                  </a:schemeClr>
+                  <a:schemeClr val="bg1"/>
                 </a:solidFill>
               </a:rPr>
-              <a:t>XmlAddressBook</a:t>
-            </a:r>
-            <a:r>
-              <a:rPr lang="en-US" sz="1050" b="1" dirty="0" smtClean="0">
+              <a:t>JsonUserPrefs</a:t>
+            </a:r>
+            <a:br>
+              <a:rPr lang="en-US" sz="1050" dirty="0">
                 <a:solidFill>
-                  <a:schemeClr val="accent6">
-                    <a:lumMod val="75000"/>
-                  </a:schemeClr>
-                </a:solidFill>
-              </a:rPr>
-              <a:t/>
-            </a:r>
-            <a:br>
-              <a:rPr lang="en-US" sz="1050" b="1" dirty="0" smtClean="0">
-                <a:solidFill>
-                  <a:schemeClr val="accent6">
-                    <a:lumMod val="75000"/>
-                  </a:schemeClr>
+                  <a:schemeClr val="bg1"/>
                 </a:solidFill>
               </a:rPr>
             </a:br>
             <a:r>
-              <a:rPr lang="en-US" sz="1050" b="1" dirty="0" smtClean="0">
+              <a:rPr lang="en-US" sz="1050" dirty="0">
                 <a:solidFill>
-                  <a:schemeClr val="accent6">
-                    <a:lumMod val="75000"/>
-                  </a:schemeClr>
+                  <a:schemeClr val="bg1"/>
                 </a:solidFill>
               </a:rPr>
               <a:t>Storage</a:t>
             </a:r>
-            <a:endParaRPr lang="en-SG" sz="1050" b="1" dirty="0">
+            <a:endParaRPr lang="en-SG" sz="1050" dirty="0">
               <a:solidFill>
-                <a:schemeClr val="accent6">
-                  <a:lumMod val="75000"/>
-                </a:schemeClr>
+                <a:schemeClr val="bg1"/>
               </a:solidFill>
             </a:endParaRPr>
           </a:p>
@@ -4197,13 +5585,19 @@
       </p:sp>
       <p:sp>
         <p:nvSpPr>
-          <p:cNvPr id="52" name="Rectangle 8"/>
+          <p:cNvPr id="88" name="Rectangle 8">
+            <a:extLst>
+              <a:ext uri="{FF2B5EF4-FFF2-40B4-BE49-F238E27FC236}">
+                <a16:creationId xmlns:a16="http://schemas.microsoft.com/office/drawing/2014/main" id="{B978CB47-7E8D-4E02-A9F3-F0EFA62EA846}"/>
+              </a:ext>
+            </a:extLst>
+          </p:cNvPr>
           <p:cNvSpPr/>
           <p:nvPr/>
         </p:nvSpPr>
         <p:spPr>
           <a:xfrm>
-            <a:off x="2873943" y="2558040"/>
+            <a:off x="2271318" y="4642304"/>
             <a:ext cx="1323049" cy="346760"/>
           </a:xfrm>
           <a:prstGeom prst="rect">
@@ -4243,7 +5637,7 @@
           <a:p>
             <a:pPr algn="ctr"/>
             <a:r>
-              <a:rPr lang="en-US" sz="1050" dirty="0" smtClean="0">
+              <a:rPr lang="en-US" sz="1050" dirty="0">
                 <a:solidFill>
                   <a:schemeClr val="bg1"/>
                 </a:solidFill>
@@ -4251,19 +5645,19 @@
               <a:t>&lt;&lt;interface&gt;&gt;</a:t>
             </a:r>
             <a:br>
-              <a:rPr lang="en-US" sz="1050" dirty="0" smtClean="0">
+              <a:rPr lang="en-US" sz="1050" dirty="0">
                 <a:solidFill>
                   <a:schemeClr val="bg1"/>
                 </a:solidFill>
               </a:rPr>
             </a:br>
             <a:r>
-              <a:rPr lang="en-US" sz="1050" dirty="0" err="1" smtClean="0">
+              <a:rPr lang="en-US" sz="1050" dirty="0" err="1">
                 <a:solidFill>
                   <a:schemeClr val="bg1"/>
                 </a:solidFill>
               </a:rPr>
-              <a:t>UserPrefsStorage</a:t>
+              <a:t>PasswordsStorage</a:t>
             </a:r>
             <a:endParaRPr lang="en-SG" sz="1050" dirty="0">
               <a:solidFill>
@@ -4275,16 +5669,22 @@
       </p:sp>
       <p:cxnSp>
         <p:nvCxnSpPr>
-          <p:cNvPr id="54" name="Straight Arrow Connector 53"/>
+          <p:cNvPr id="89" name="Straight Arrow Connector 88">
+            <a:extLst>
+              <a:ext uri="{FF2B5EF4-FFF2-40B4-BE49-F238E27FC236}">
+                <a16:creationId xmlns:a16="http://schemas.microsoft.com/office/drawing/2014/main" id="{AA8887EF-103B-43AE-A31C-F8AA8CC9DD61}"/>
+              </a:ext>
+            </a:extLst>
+          </p:cNvPr>
           <p:cNvCxnSpPr>
-            <a:stCxn id="56" idx="3"/>
-            <a:endCxn id="52" idx="1"/>
+            <a:stCxn id="90" idx="3"/>
+            <a:endCxn id="88" idx="1"/>
           </p:cNvCxnSpPr>
           <p:nvPr/>
         </p:nvCxnSpPr>
         <p:spPr>
           <a:xfrm>
-            <a:off x="2653133" y="2726136"/>
+            <a:off x="2050508" y="4810400"/>
             <a:ext cx="220810" cy="5284"/>
           </a:xfrm>
           <a:prstGeom prst="straightConnector1">
@@ -4318,13 +5718,19 @@
       </p:cxnSp>
       <p:sp>
         <p:nvSpPr>
-          <p:cNvPr id="56" name="Flowchart: Decision 96"/>
+          <p:cNvPr id="90" name="Flowchart: Decision 96">
+            <a:extLst>
+              <a:ext uri="{FF2B5EF4-FFF2-40B4-BE49-F238E27FC236}">
+                <a16:creationId xmlns:a16="http://schemas.microsoft.com/office/drawing/2014/main" id="{8BDE122A-3E32-4E87-ABA8-640BEA3FB960}"/>
+              </a:ext>
+            </a:extLst>
+          </p:cNvPr>
           <p:cNvSpPr/>
           <p:nvPr/>
         </p:nvSpPr>
         <p:spPr>
           <a:xfrm>
-            <a:off x="2417085" y="2639446"/>
+            <a:off x="1814460" y="4723710"/>
             <a:ext cx="236048" cy="173380"/>
           </a:xfrm>
           <a:prstGeom prst="flowChartDecision">
@@ -4369,16 +5775,22 @@
       </p:sp>
       <p:cxnSp>
         <p:nvCxnSpPr>
-          <p:cNvPr id="60" name="Elbow Connector 63"/>
+          <p:cNvPr id="91" name="Elbow Connector 63">
+            <a:extLst>
+              <a:ext uri="{FF2B5EF4-FFF2-40B4-BE49-F238E27FC236}">
+                <a16:creationId xmlns:a16="http://schemas.microsoft.com/office/drawing/2014/main" id="{F1F4B0D8-0467-410B-9B6D-93A7A75F99E9}"/>
+              </a:ext>
+            </a:extLst>
+          </p:cNvPr>
           <p:cNvCxnSpPr>
-            <a:stCxn id="61" idx="3"/>
-            <a:endCxn id="65" idx="1"/>
+            <a:stCxn id="92" idx="3"/>
+            <a:endCxn id="93" idx="1"/>
           </p:cNvCxnSpPr>
           <p:nvPr/>
         </p:nvCxnSpPr>
         <p:spPr>
           <a:xfrm flipV="1">
-            <a:off x="4394804" y="2731420"/>
+            <a:off x="3792179" y="4815684"/>
             <a:ext cx="223324" cy="1"/>
           </a:xfrm>
           <a:prstGeom prst="bentConnector3">
@@ -4415,13 +5827,19 @@
       </p:cxnSp>
       <p:sp>
         <p:nvSpPr>
-          <p:cNvPr id="61" name="Isosceles Triangle 102"/>
+          <p:cNvPr id="92" name="Isosceles Triangle 102">
+            <a:extLst>
+              <a:ext uri="{FF2B5EF4-FFF2-40B4-BE49-F238E27FC236}">
+                <a16:creationId xmlns:a16="http://schemas.microsoft.com/office/drawing/2014/main" id="{333031D9-A523-4537-8417-59A14A606808}"/>
+              </a:ext>
+            </a:extLst>
+          </p:cNvPr>
           <p:cNvSpPr/>
           <p:nvPr/>
         </p:nvSpPr>
         <p:spPr>
           <a:xfrm rot="5400000" flipV="1">
-            <a:off x="4171790" y="2643659"/>
+            <a:off x="3569165" y="4727923"/>
             <a:ext cx="270504" cy="175523"/>
           </a:xfrm>
           <a:prstGeom prst="triangle">
@@ -4470,13 +5888,19 @@
       </p:sp>
       <p:sp>
         <p:nvSpPr>
-          <p:cNvPr id="65" name="Rectangle 8"/>
+          <p:cNvPr id="93" name="Rectangle 8">
+            <a:extLst>
+              <a:ext uri="{FF2B5EF4-FFF2-40B4-BE49-F238E27FC236}">
+                <a16:creationId xmlns:a16="http://schemas.microsoft.com/office/drawing/2014/main" id="{0F445AFD-6D4E-4F1E-8E8A-6AA83FF36B64}"/>
+              </a:ext>
+            </a:extLst>
+          </p:cNvPr>
           <p:cNvSpPr/>
           <p:nvPr/>
         </p:nvSpPr>
         <p:spPr>
           <a:xfrm>
-            <a:off x="4618128" y="2558040"/>
+            <a:off x="4015503" y="4642304"/>
             <a:ext cx="1093635" cy="346760"/>
           </a:xfrm>
           <a:prstGeom prst="rect">
@@ -4516,30 +5940,23 @@
           <a:p>
             <a:pPr algn="ctr"/>
             <a:r>
-              <a:rPr lang="en-US" sz="1050" dirty="0" err="1" smtClean="0">
+              <a:rPr lang="en-US" sz="1050" dirty="0" err="1">
                 <a:solidFill>
                   <a:schemeClr val="bg1"/>
                 </a:solidFill>
               </a:rPr>
-              <a:t>JsonUserPrefs</a:t>
-            </a:r>
-            <a:r>
-              <a:rPr lang="en-US" sz="1050" dirty="0" smtClean="0">
-                <a:solidFill>
-                  <a:schemeClr val="bg1"/>
-                </a:solidFill>
-              </a:rPr>
-              <a:t/>
-            </a:r>
-            <a:br>
-              <a:rPr lang="en-US" sz="1050" dirty="0" smtClean="0">
-                <a:solidFill>
-                  <a:schemeClr val="bg1"/>
-                </a:solidFill>
-              </a:rPr>
-            </a:br>
-            <a:r>
-              <a:rPr lang="en-US" sz="1050" dirty="0" smtClean="0">
+              <a:t>JsonPasswords</a:t>
+            </a:r>
+            <a:endParaRPr lang="en-US" sz="1050" dirty="0">
+              <a:solidFill>
+                <a:schemeClr val="bg1"/>
+              </a:solidFill>
+            </a:endParaRPr>
+          </a:p>
+          <a:p>
+            <a:pPr algn="ctr"/>
+            <a:r>
+              <a:rPr lang="en-US" sz="1050" dirty="0">
                 <a:solidFill>
                   <a:schemeClr val="bg1"/>
                 </a:solidFill>
@@ -4554,285 +5971,6 @@
           </a:p>
         </p:txBody>
       </p:sp>
-      <p:sp>
-        <p:nvSpPr>
-          <p:cNvPr id="66" name="Rectangle 8"/>
-          <p:cNvSpPr/>
-          <p:nvPr/>
-        </p:nvSpPr>
-        <p:spPr>
-          <a:xfrm>
-            <a:off x="6019800" y="3160410"/>
-            <a:ext cx="1200707" cy="346760"/>
-          </a:xfrm>
-          <a:prstGeom prst="rect">
-            <a:avLst/>
-          </a:prstGeom>
-          <a:ln w="19050"/>
-          <a:effectLst/>
-        </p:spPr>
-        <p:style>
-          <a:lnRef idx="1">
-            <a:schemeClr val="accent6"/>
-          </a:lnRef>
-          <a:fillRef idx="2">
-            <a:schemeClr val="accent6"/>
-          </a:fillRef>
-          <a:effectRef idx="1">
-            <a:schemeClr val="accent6"/>
-          </a:effectRef>
-          <a:fontRef idx="minor">
-            <a:schemeClr val="dk1"/>
-          </a:fontRef>
-        </p:style>
-        <p:txBody>
-          <a:bodyPr rtlCol="0" anchor="ctr"/>
-          <a:lstStyle/>
-          <a:p>
-            <a:pPr algn="ctr"/>
-            <a:r>
-              <a:rPr lang="en-US" sz="1050" b="1" dirty="0" err="1" smtClean="0">
-                <a:solidFill>
-                  <a:schemeClr val="accent6">
-                    <a:lumMod val="75000"/>
-                  </a:schemeClr>
-                </a:solidFill>
-              </a:rPr>
-              <a:t>XmlSerializable</a:t>
-            </a:r>
-            <a:r>
-              <a:rPr lang="en-US" sz="1050" b="1" dirty="0" smtClean="0">
-                <a:solidFill>
-                  <a:schemeClr val="accent6">
-                    <a:lumMod val="75000"/>
-                  </a:schemeClr>
-                </a:solidFill>
-              </a:rPr>
-              <a:t/>
-            </a:r>
-            <a:br>
-              <a:rPr lang="en-US" sz="1050" b="1" dirty="0" smtClean="0">
-                <a:solidFill>
-                  <a:schemeClr val="accent6">
-                    <a:lumMod val="75000"/>
-                  </a:schemeClr>
-                </a:solidFill>
-              </a:rPr>
-            </a:br>
-            <a:r>
-              <a:rPr lang="en-US" sz="1050" b="1" dirty="0" err="1" smtClean="0">
-                <a:solidFill>
-                  <a:schemeClr val="accent6">
-                    <a:lumMod val="75000"/>
-                  </a:schemeClr>
-                </a:solidFill>
-              </a:rPr>
-              <a:t>AddressBook</a:t>
-            </a:r>
-            <a:endParaRPr lang="en-SG" sz="1050" b="1" dirty="0">
-              <a:solidFill>
-                <a:schemeClr val="accent6">
-                  <a:lumMod val="75000"/>
-                </a:schemeClr>
-              </a:solidFill>
-            </a:endParaRPr>
-          </a:p>
-        </p:txBody>
-      </p:sp>
-      <p:cxnSp>
-        <p:nvCxnSpPr>
-          <p:cNvPr id="70" name="Elbow Connector 122"/>
-          <p:cNvCxnSpPr>
-            <a:stCxn id="74" idx="0"/>
-            <a:endCxn id="73" idx="2"/>
-          </p:cNvCxnSpPr>
-          <p:nvPr/>
-        </p:nvCxnSpPr>
-        <p:spPr>
-          <a:xfrm rot="5400000" flipH="1" flipV="1">
-            <a:off x="8077993" y="2992020"/>
-            <a:ext cx="335208" cy="12700"/>
-          </a:xfrm>
-          <a:prstGeom prst="bentConnector3">
-            <a:avLst>
-              <a:gd name="adj1" fmla="val 50000"/>
-            </a:avLst>
-          </a:prstGeom>
-          <a:ln w="19050">
-            <a:prstDash val="sysDot"/>
-            <a:headEnd type="none" w="med" len="med"/>
-            <a:tailEnd type="arrow" w="med" len="med"/>
-          </a:ln>
-          <a:effectLst/>
-        </p:spPr>
-        <p:style>
-          <a:lnRef idx="1">
-            <a:schemeClr val="accent6"/>
-          </a:lnRef>
-          <a:fillRef idx="2">
-            <a:schemeClr val="accent6"/>
-          </a:fillRef>
-          <a:effectRef idx="1">
-            <a:schemeClr val="accent6"/>
-          </a:effectRef>
-          <a:fontRef idx="minor">
-            <a:schemeClr val="dk1"/>
-          </a:fontRef>
-        </p:style>
-      </p:cxnSp>
-      <p:sp>
-        <p:nvSpPr>
-          <p:cNvPr id="73" name="Rectangle 8"/>
-          <p:cNvSpPr/>
-          <p:nvPr/>
-        </p:nvSpPr>
-        <p:spPr>
-          <a:xfrm>
-            <a:off x="7615738" y="2477656"/>
-            <a:ext cx="1259718" cy="346760"/>
-          </a:xfrm>
-          <a:prstGeom prst="rect">
-            <a:avLst/>
-          </a:prstGeom>
-          <a:ln w="19050"/>
-          <a:effectLst/>
-        </p:spPr>
-        <p:style>
-          <a:lnRef idx="1">
-            <a:schemeClr val="accent6"/>
-          </a:lnRef>
-          <a:fillRef idx="2">
-            <a:schemeClr val="accent6"/>
-          </a:fillRef>
-          <a:effectRef idx="1">
-            <a:schemeClr val="accent6"/>
-          </a:effectRef>
-          <a:fontRef idx="minor">
-            <a:schemeClr val="dk1"/>
-          </a:fontRef>
-        </p:style>
-        <p:txBody>
-          <a:bodyPr rtlCol="0" anchor="ctr"/>
-          <a:lstStyle/>
-          <a:p>
-            <a:pPr algn="ctr"/>
-            <a:r>
-              <a:rPr lang="en-US" sz="1050" b="1" dirty="0" err="1" smtClean="0">
-                <a:solidFill>
-                  <a:schemeClr val="accent6">
-                    <a:lumMod val="75000"/>
-                  </a:schemeClr>
-                </a:solidFill>
-              </a:rPr>
-              <a:t>XmlAdaptedTag</a:t>
-            </a:r>
-            <a:endParaRPr lang="en-SG" sz="1050" b="1" dirty="0">
-              <a:solidFill>
-                <a:schemeClr val="accent6">
-                  <a:lumMod val="75000"/>
-                </a:schemeClr>
-              </a:solidFill>
-            </a:endParaRPr>
-          </a:p>
-        </p:txBody>
-      </p:sp>
-      <p:sp>
-        <p:nvSpPr>
-          <p:cNvPr id="74" name="Rectangle 8"/>
-          <p:cNvSpPr/>
-          <p:nvPr/>
-        </p:nvSpPr>
-        <p:spPr>
-          <a:xfrm>
-            <a:off x="7615738" y="3159624"/>
-            <a:ext cx="1259718" cy="346760"/>
-          </a:xfrm>
-          <a:prstGeom prst="rect">
-            <a:avLst/>
-          </a:prstGeom>
-          <a:ln w="19050"/>
-          <a:effectLst/>
-        </p:spPr>
-        <p:style>
-          <a:lnRef idx="1">
-            <a:schemeClr val="accent6"/>
-          </a:lnRef>
-          <a:fillRef idx="2">
-            <a:schemeClr val="accent6"/>
-          </a:fillRef>
-          <a:effectRef idx="1">
-            <a:schemeClr val="accent6"/>
-          </a:effectRef>
-          <a:fontRef idx="minor">
-            <a:schemeClr val="dk1"/>
-          </a:fontRef>
-        </p:style>
-        <p:txBody>
-          <a:bodyPr rtlCol="0" anchor="ctr"/>
-          <a:lstStyle/>
-          <a:p>
-            <a:pPr algn="ctr"/>
-            <a:r>
-              <a:rPr lang="en-US" sz="1050" b="1" dirty="0" err="1" smtClean="0">
-                <a:solidFill>
-                  <a:schemeClr val="accent6">
-                    <a:lumMod val="75000"/>
-                  </a:schemeClr>
-                </a:solidFill>
-              </a:rPr>
-              <a:t>XmlAdaptedPerson</a:t>
-            </a:r>
-            <a:endParaRPr lang="en-SG" sz="1050" b="1" dirty="0">
-              <a:solidFill>
-                <a:schemeClr val="accent6">
-                  <a:lumMod val="75000"/>
-                </a:schemeClr>
-              </a:solidFill>
-            </a:endParaRPr>
-          </a:p>
-        </p:txBody>
-      </p:sp>
-      <p:cxnSp>
-        <p:nvCxnSpPr>
-          <p:cNvPr id="77" name="Elbow Connector 122"/>
-          <p:cNvCxnSpPr>
-            <a:stCxn id="66" idx="3"/>
-            <a:endCxn id="74" idx="1"/>
-          </p:cNvCxnSpPr>
-          <p:nvPr/>
-        </p:nvCxnSpPr>
-        <p:spPr>
-          <a:xfrm flipV="1">
-            <a:off x="7220507" y="3333004"/>
-            <a:ext cx="395231" cy="786"/>
-          </a:xfrm>
-          <a:prstGeom prst="bentConnector3">
-            <a:avLst>
-              <a:gd name="adj1" fmla="val 50000"/>
-            </a:avLst>
-          </a:prstGeom>
-          <a:ln w="19050">
-            <a:prstDash val="sysDot"/>
-            <a:headEnd type="none" w="med" len="med"/>
-            <a:tailEnd type="arrow" w="med" len="med"/>
-          </a:ln>
-          <a:effectLst/>
-        </p:spPr>
-        <p:style>
-          <a:lnRef idx="1">
-            <a:schemeClr val="accent6"/>
-          </a:lnRef>
-          <a:fillRef idx="2">
-            <a:schemeClr val="accent6"/>
-          </a:fillRef>
-          <a:effectRef idx="1">
-            <a:schemeClr val="accent6"/>
-          </a:effectRef>
-          <a:fontRef idx="minor">
-            <a:schemeClr val="dk1"/>
-          </a:fontRef>
-        </p:style>
-      </p:cxnSp>
     </p:spTree>
     <p:extLst>
       <p:ext uri="{BB962C8B-B14F-4D97-AF65-F5344CB8AC3E}">
@@ -4843,13 +5981,6 @@
   <p:clrMapOvr>
     <a:masterClrMapping/>
   </p:clrMapOvr>
-  <p:timing>
-    <p:tnLst>
-      <p:par>
-        <p:cTn id="1" dur="indefinite" restart="never" nodeType="tmRoot"/>
-      </p:par>
-    </p:tnLst>
-  </p:timing>
 </p:sld>
 </file>
 

</xml_diff>